<commit_message>
trying to reconcile site
</commit_message>
<xml_diff>
--- a/ASMU432/ppts/Back to politics 1980s.pptx
+++ b/ASMU432/ppts/Back to politics 1980s.pptx
@@ -130,6 +130,118 @@
 </p:presentation>
 </file>
 
+<file path=ppt/revisionInfo.xml><?xml version="1.0" encoding="utf-8"?>
+<p1510:revInfo xmlns:a="http://schemas.openxmlformats.org/drawingml/2006/main" xmlns:r="http://schemas.openxmlformats.org/officeDocument/2006/relationships" xmlns:p1510="http://schemas.microsoft.com/office/powerpoint/2015/10/main">
+  <p1510:revLst>
+    <p1510:client id="{1AB72D77-40B2-4295-BFF9-2F4124D4CE59}" v="3" dt="2019-12-04T22:50:14.869"/>
+  </p1510:revLst>
+</p1510:revInfo>
+</file>
+
+<file path=ppt/changesInfos/changesInfo1.xml><?xml version="1.0" encoding="utf-8"?>
+<pc:chgInfo xmlns:a="http://schemas.openxmlformats.org/drawingml/2006/main" xmlns:r="http://schemas.openxmlformats.org/officeDocument/2006/relationships" xmlns:ac="http://schemas.microsoft.com/office/drawing/2013/main/command" xmlns:pc="http://schemas.microsoft.com/office/powerpoint/2013/main/command">
+  <pc:docChgLst>
+    <pc:chgData name="Mark Baker" userId="7debe814d9197520" providerId="LiveId" clId="{1AB72D77-40B2-4295-BFF9-2F4124D4CE59}"/>
+    <pc:docChg chg="modSld">
+      <pc:chgData name="Mark Baker" userId="7debe814d9197520" providerId="LiveId" clId="{1AB72D77-40B2-4295-BFF9-2F4124D4CE59}" dt="2019-12-04T23:42:49.025" v="51" actId="20577"/>
+      <pc:docMkLst>
+        <pc:docMk/>
+      </pc:docMkLst>
+      <pc:sldChg chg="modSp">
+        <pc:chgData name="Mark Baker" userId="7debe814d9197520" providerId="LiveId" clId="{1AB72D77-40B2-4295-BFF9-2F4124D4CE59}" dt="2019-12-02T21:03:18.339" v="4" actId="255"/>
+        <pc:sldMkLst>
+          <pc:docMk/>
+          <pc:sldMk cId="3485172437" sldId="256"/>
+        </pc:sldMkLst>
+        <pc:spChg chg="mod">
+          <ac:chgData name="Mark Baker" userId="7debe814d9197520" providerId="LiveId" clId="{1AB72D77-40B2-4295-BFF9-2F4124D4CE59}" dt="2019-12-02T21:03:18.339" v="4" actId="255"/>
+          <ac:spMkLst>
+            <pc:docMk/>
+            <pc:sldMk cId="3485172437" sldId="256"/>
+            <ac:spMk id="3" creationId="{00000000-0000-0000-0000-000000000000}"/>
+          </ac:spMkLst>
+        </pc:spChg>
+      </pc:sldChg>
+      <pc:sldChg chg="modSp">
+        <pc:chgData name="Mark Baker" userId="7debe814d9197520" providerId="LiveId" clId="{1AB72D77-40B2-4295-BFF9-2F4124D4CE59}" dt="2019-12-02T21:06:11.541" v="6" actId="20577"/>
+        <pc:sldMkLst>
+          <pc:docMk/>
+          <pc:sldMk cId="3557401299" sldId="257"/>
+        </pc:sldMkLst>
+        <pc:spChg chg="mod">
+          <ac:chgData name="Mark Baker" userId="7debe814d9197520" providerId="LiveId" clId="{1AB72D77-40B2-4295-BFF9-2F4124D4CE59}" dt="2019-12-02T21:06:11.541" v="6" actId="20577"/>
+          <ac:spMkLst>
+            <pc:docMk/>
+            <pc:sldMk cId="3557401299" sldId="257"/>
+            <ac:spMk id="5" creationId="{00000000-0000-0000-0000-000000000000}"/>
+          </ac:spMkLst>
+        </pc:spChg>
+      </pc:sldChg>
+      <pc:sldChg chg="modSp">
+        <pc:chgData name="Mark Baker" userId="7debe814d9197520" providerId="LiveId" clId="{1AB72D77-40B2-4295-BFF9-2F4124D4CE59}" dt="2019-12-02T21:07:18.629" v="8" actId="20577"/>
+        <pc:sldMkLst>
+          <pc:docMk/>
+          <pc:sldMk cId="3210963805" sldId="259"/>
+        </pc:sldMkLst>
+        <pc:spChg chg="mod">
+          <ac:chgData name="Mark Baker" userId="7debe814d9197520" providerId="LiveId" clId="{1AB72D77-40B2-4295-BFF9-2F4124D4CE59}" dt="2019-12-02T21:07:18.629" v="8" actId="20577"/>
+          <ac:spMkLst>
+            <pc:docMk/>
+            <pc:sldMk cId="3210963805" sldId="259"/>
+            <ac:spMk id="3" creationId="{00000000-0000-0000-0000-000000000000}"/>
+          </ac:spMkLst>
+        </pc:spChg>
+      </pc:sldChg>
+      <pc:sldChg chg="modSp">
+        <pc:chgData name="Mark Baker" userId="7debe814d9197520" providerId="LiveId" clId="{1AB72D77-40B2-4295-BFF9-2F4124D4CE59}" dt="2019-12-04T22:50:15.592" v="30" actId="20577"/>
+        <pc:sldMkLst>
+          <pc:docMk/>
+          <pc:sldMk cId="4195586606" sldId="266"/>
+        </pc:sldMkLst>
+        <pc:spChg chg="mod">
+          <ac:chgData name="Mark Baker" userId="7debe814d9197520" providerId="LiveId" clId="{1AB72D77-40B2-4295-BFF9-2F4124D4CE59}" dt="2019-12-04T22:50:15.592" v="30" actId="20577"/>
+          <ac:spMkLst>
+            <pc:docMk/>
+            <pc:sldMk cId="4195586606" sldId="266"/>
+            <ac:spMk id="3" creationId="{00000000-0000-0000-0000-000000000000}"/>
+          </ac:spMkLst>
+        </pc:spChg>
+      </pc:sldChg>
+      <pc:sldChg chg="modSp">
+        <pc:chgData name="Mark Baker" userId="7debe814d9197520" providerId="LiveId" clId="{1AB72D77-40B2-4295-BFF9-2F4124D4CE59}" dt="2019-12-04T18:37:11.373" v="28" actId="20577"/>
+        <pc:sldMkLst>
+          <pc:docMk/>
+          <pc:sldMk cId="1880454714" sldId="270"/>
+        </pc:sldMkLst>
+        <pc:spChg chg="mod">
+          <ac:chgData name="Mark Baker" userId="7debe814d9197520" providerId="LiveId" clId="{1AB72D77-40B2-4295-BFF9-2F4124D4CE59}" dt="2019-12-04T18:37:11.373" v="28" actId="20577"/>
+          <ac:spMkLst>
+            <pc:docMk/>
+            <pc:sldMk cId="1880454714" sldId="270"/>
+            <ac:spMk id="3" creationId="{00000000-0000-0000-0000-000000000000}"/>
+          </ac:spMkLst>
+        </pc:spChg>
+      </pc:sldChg>
+      <pc:sldChg chg="modSp">
+        <pc:chgData name="Mark Baker" userId="7debe814d9197520" providerId="LiveId" clId="{1AB72D77-40B2-4295-BFF9-2F4124D4CE59}" dt="2019-12-04T23:42:49.025" v="51" actId="20577"/>
+        <pc:sldMkLst>
+          <pc:docMk/>
+          <pc:sldMk cId="903807790" sldId="271"/>
+        </pc:sldMkLst>
+        <pc:spChg chg="mod">
+          <ac:chgData name="Mark Baker" userId="7debe814d9197520" providerId="LiveId" clId="{1AB72D77-40B2-4295-BFF9-2F4124D4CE59}" dt="2019-12-04T23:42:49.025" v="51" actId="20577"/>
+          <ac:spMkLst>
+            <pc:docMk/>
+            <pc:sldMk cId="903807790" sldId="271"/>
+            <ac:spMk id="3" creationId="{00000000-0000-0000-0000-000000000000}"/>
+          </ac:spMkLst>
+        </pc:spChg>
+      </pc:sldChg>
+    </pc:docChg>
+  </pc:docChgLst>
+</pc:chgInfo>
+</file>
+
 <file path=ppt/notesMasters/notesMaster1.xml><?xml version="1.0" encoding="utf-8"?>
 <p:notesMaster xmlns:a="http://schemas.openxmlformats.org/drawingml/2006/main" xmlns:r="http://schemas.openxmlformats.org/officeDocument/2006/relationships" xmlns:p="http://schemas.openxmlformats.org/presentationml/2006/main">
   <p:cSld>
@@ -212,7 +324,7 @@
           <a:p>
             <a:fld id="{69C457A5-B004-4511-BF82-5B1124472C33}" type="datetimeFigureOut">
               <a:rPr lang="en-US" smtClean="0"/>
-              <a:t>12/28/2016</a:t>
+              <a:t>12/4/2019</a:t>
             </a:fld>
             <a:endParaRPr lang="en-US"/>
           </a:p>
@@ -276,38 +388,37 @@
           <a:p>
             <a:pPr lvl="0"/>
             <a:r>
-              <a:rPr lang="en-US" smtClean="0"/>
+              <a:rPr lang="en-US"/>
               <a:t>Click to edit Master text styles</a:t>
             </a:r>
           </a:p>
           <a:p>
             <a:pPr lvl="1"/>
             <a:r>
-              <a:rPr lang="en-US" smtClean="0"/>
+              <a:rPr lang="en-US"/>
               <a:t>Second level</a:t>
             </a:r>
           </a:p>
           <a:p>
             <a:pPr lvl="2"/>
             <a:r>
-              <a:rPr lang="en-US" smtClean="0"/>
+              <a:rPr lang="en-US"/>
               <a:t>Third level</a:t>
             </a:r>
           </a:p>
           <a:p>
             <a:pPr lvl="3"/>
             <a:r>
-              <a:rPr lang="en-US" smtClean="0"/>
+              <a:rPr lang="en-US"/>
               <a:t>Fourth level</a:t>
             </a:r>
           </a:p>
           <a:p>
             <a:pPr lvl="4"/>
             <a:r>
-              <a:rPr lang="en-US" smtClean="0"/>
+              <a:rPr lang="en-US"/>
               <a:t>Fifth level</a:t>
             </a:r>
-            <a:endParaRPr lang="en-US"/>
           </a:p>
         </p:txBody>
       </p:sp>
@@ -525,7 +636,7 @@
           <a:lstStyle/>
           <a:p>
             <a:r>
-              <a:rPr lang="en-US" sz="1200" b="0" i="0" kern="1200" dirty="0" smtClean="0">
+              <a:rPr lang="en-US" sz="1200" b="0" i="0" kern="1200" dirty="0">
                 <a:solidFill>
                   <a:schemeClr val="tx1"/>
                 </a:solidFill>
@@ -537,7 +648,7 @@
               <a:t>Laing, Dave. 2004. “World Record Sales 1992-2002”. </a:t>
             </a:r>
             <a:r>
-              <a:rPr lang="en-US" sz="1200" b="0" i="1" kern="1200" dirty="0" smtClean="0">
+              <a:rPr lang="en-US" sz="1200" b="0" i="1" kern="1200" dirty="0">
                 <a:solidFill>
                   <a:schemeClr val="tx1"/>
                 </a:solidFill>
@@ -549,7 +660,7 @@
               <a:t>Popular Music</a:t>
             </a:r>
             <a:r>
-              <a:rPr lang="en-US" sz="1200" b="0" i="0" kern="1200" dirty="0" smtClean="0">
+              <a:rPr lang="en-US" sz="1200" b="0" i="0" kern="1200" dirty="0">
                 <a:solidFill>
                   <a:schemeClr val="tx1"/>
                 </a:solidFill>
@@ -645,7 +756,7 @@
           <a:lstStyle/>
           <a:p>
             <a:r>
-              <a:rPr lang="en-US" sz="1200" b="0" i="0" kern="1200" dirty="0" smtClean="0">
+              <a:rPr lang="en-US" sz="1200" b="0" i="0" kern="1200" dirty="0">
                 <a:solidFill>
                   <a:schemeClr val="tx1"/>
                 </a:solidFill>
@@ -657,7 +768,7 @@
               <a:t>Laing, Dave. 2004. “World Record Sales 1992-2002”. </a:t>
             </a:r>
             <a:r>
-              <a:rPr lang="en-US" sz="1200" b="0" i="1" kern="1200" dirty="0" smtClean="0">
+              <a:rPr lang="en-US" sz="1200" b="0" i="1" kern="1200" dirty="0">
                 <a:solidFill>
                   <a:schemeClr val="tx1"/>
                 </a:solidFill>
@@ -669,7 +780,7 @@
               <a:t>Popular Music</a:t>
             </a:r>
             <a:r>
-              <a:rPr lang="en-US" sz="1200" b="0" i="0" kern="1200" dirty="0" smtClean="0">
+              <a:rPr lang="en-US" sz="1200" b="0" i="0" kern="1200" dirty="0">
                 <a:solidFill>
                   <a:schemeClr val="tx1"/>
                 </a:solidFill>
@@ -768,7 +879,7 @@
           </a:lstStyle>
           <a:p>
             <a:r>
-              <a:rPr lang="en-US" smtClean="0"/>
+              <a:rPr lang="en-US"/>
               <a:t>Click to edit Master title style</a:t>
             </a:r>
             <a:endParaRPr lang="en-US" dirty="0"/>
@@ -844,7 +955,7 @@
           </a:lstStyle>
           <a:p>
             <a:r>
-              <a:rPr lang="en-US" smtClean="0"/>
+              <a:rPr lang="en-US"/>
               <a:t>Click to edit Master subtitle style</a:t>
             </a:r>
             <a:endParaRPr lang="en-US" dirty="0"/>
@@ -882,7 +993,7 @@
             <a:fld id="{87DE6118-2437-4B30-8E3C-4D2BE6020583}" type="datetimeFigureOut">
               <a:rPr lang="en-US" dirty="0"/>
               <a:pPr/>
-              <a:t>12/28/2016</a:t>
+              <a:t>12/4/2019</a:t>
             </a:fld>
             <a:endParaRPr lang="en-US" dirty="0"/>
           </a:p>
@@ -1127,7 +1238,7 @@
           <a:lstStyle/>
           <a:p>
             <a:r>
-              <a:rPr lang="en-US" smtClean="0"/>
+              <a:rPr lang="en-US"/>
               <a:t>Click to edit Master title style</a:t>
             </a:r>
             <a:endParaRPr lang="en-US" dirty="0"/>
@@ -1156,35 +1267,35 @@
           <a:p>
             <a:pPr lvl="0"/>
             <a:r>
-              <a:rPr lang="en-US" smtClean="0"/>
+              <a:rPr lang="en-US"/>
               <a:t>Click to edit Master text styles</a:t>
             </a:r>
           </a:p>
           <a:p>
             <a:pPr lvl="1"/>
             <a:r>
-              <a:rPr lang="en-US" smtClean="0"/>
+              <a:rPr lang="en-US"/>
               <a:t>Second level</a:t>
             </a:r>
           </a:p>
           <a:p>
             <a:pPr lvl="2"/>
             <a:r>
-              <a:rPr lang="en-US" smtClean="0"/>
+              <a:rPr lang="en-US"/>
               <a:t>Third level</a:t>
             </a:r>
           </a:p>
           <a:p>
             <a:pPr lvl="3"/>
             <a:r>
-              <a:rPr lang="en-US" smtClean="0"/>
+              <a:rPr lang="en-US"/>
               <a:t>Fourth level</a:t>
             </a:r>
           </a:p>
           <a:p>
             <a:pPr lvl="4"/>
             <a:r>
-              <a:rPr lang="en-US" smtClean="0"/>
+              <a:rPr lang="en-US"/>
               <a:t>Fifth level</a:t>
             </a:r>
             <a:endParaRPr lang="en-US" dirty="0"/>
@@ -1208,7 +1319,7 @@
           <a:p>
             <a:fld id="{87DE6118-2437-4B30-8E3C-4D2BE6020583}" type="datetimeFigureOut">
               <a:rPr lang="en-US" dirty="0"/>
-              <a:t>12/28/2016</a:t>
+              <a:t>12/4/2019</a:t>
             </a:fld>
             <a:endParaRPr lang="en-US" dirty="0"/>
           </a:p>
@@ -1302,7 +1413,7 @@
           <a:lstStyle/>
           <a:p>
             <a:r>
-              <a:rPr lang="en-US" smtClean="0"/>
+              <a:rPr lang="en-US"/>
               <a:t>Click to edit Master title style</a:t>
             </a:r>
             <a:endParaRPr lang="en-US" dirty="0"/>
@@ -1331,35 +1442,35 @@
           <a:p>
             <a:pPr lvl="0"/>
             <a:r>
-              <a:rPr lang="en-US" smtClean="0"/>
+              <a:rPr lang="en-US"/>
               <a:t>Click to edit Master text styles</a:t>
             </a:r>
           </a:p>
           <a:p>
             <a:pPr lvl="1"/>
             <a:r>
-              <a:rPr lang="en-US" smtClean="0"/>
+              <a:rPr lang="en-US"/>
               <a:t>Second level</a:t>
             </a:r>
           </a:p>
           <a:p>
             <a:pPr lvl="2"/>
             <a:r>
-              <a:rPr lang="en-US" smtClean="0"/>
+              <a:rPr lang="en-US"/>
               <a:t>Third level</a:t>
             </a:r>
           </a:p>
           <a:p>
             <a:pPr lvl="3"/>
             <a:r>
-              <a:rPr lang="en-US" smtClean="0"/>
+              <a:rPr lang="en-US"/>
               <a:t>Fourth level</a:t>
             </a:r>
           </a:p>
           <a:p>
             <a:pPr lvl="4"/>
             <a:r>
-              <a:rPr lang="en-US" smtClean="0"/>
+              <a:rPr lang="en-US"/>
               <a:t>Fifth level</a:t>
             </a:r>
             <a:endParaRPr lang="en-US" dirty="0"/>
@@ -1383,7 +1494,7 @@
           <a:p>
             <a:fld id="{87DE6118-2437-4B30-8E3C-4D2BE6020583}" type="datetimeFigureOut">
               <a:rPr lang="en-US" dirty="0"/>
-              <a:t>12/28/2016</a:t>
+              <a:t>12/4/2019</a:t>
             </a:fld>
             <a:endParaRPr lang="en-US" dirty="0"/>
           </a:p>
@@ -1472,7 +1583,7 @@
           <a:lstStyle/>
           <a:p>
             <a:r>
-              <a:rPr lang="en-US" smtClean="0"/>
+              <a:rPr lang="en-US"/>
               <a:t>Click to edit Master title style</a:t>
             </a:r>
             <a:endParaRPr lang="en-US" dirty="0"/>
@@ -1496,35 +1607,35 @@
           <a:p>
             <a:pPr lvl="0"/>
             <a:r>
-              <a:rPr lang="en-US" smtClean="0"/>
+              <a:rPr lang="en-US"/>
               <a:t>Click to edit Master text styles</a:t>
             </a:r>
           </a:p>
           <a:p>
             <a:pPr lvl="1"/>
             <a:r>
-              <a:rPr lang="en-US" smtClean="0"/>
+              <a:rPr lang="en-US"/>
               <a:t>Second level</a:t>
             </a:r>
           </a:p>
           <a:p>
             <a:pPr lvl="2"/>
             <a:r>
-              <a:rPr lang="en-US" smtClean="0"/>
+              <a:rPr lang="en-US"/>
               <a:t>Third level</a:t>
             </a:r>
           </a:p>
           <a:p>
             <a:pPr lvl="3"/>
             <a:r>
-              <a:rPr lang="en-US" smtClean="0"/>
+              <a:rPr lang="en-US"/>
               <a:t>Fourth level</a:t>
             </a:r>
           </a:p>
           <a:p>
             <a:pPr lvl="4"/>
             <a:r>
-              <a:rPr lang="en-US" smtClean="0"/>
+              <a:rPr lang="en-US"/>
               <a:t>Fifth level</a:t>
             </a:r>
             <a:endParaRPr lang="en-US" dirty="0"/>
@@ -1548,7 +1659,7 @@
           <a:p>
             <a:fld id="{87DE6118-2437-4B30-8E3C-4D2BE6020583}" type="datetimeFigureOut">
               <a:rPr lang="en-US" dirty="0"/>
-              <a:t>12/28/2016</a:t>
+              <a:t>12/4/2019</a:t>
             </a:fld>
             <a:endParaRPr lang="en-US" dirty="0"/>
           </a:p>
@@ -1652,7 +1763,7 @@
           </a:lstStyle>
           <a:p>
             <a:r>
-              <a:rPr lang="en-US" smtClean="0"/>
+              <a:rPr lang="en-US"/>
               <a:t>Click to edit Master title style</a:t>
             </a:r>
             <a:endParaRPr lang="en-US" dirty="0"/>
@@ -1779,7 +1890,7 @@
           <a:p>
             <a:pPr lvl="0"/>
             <a:r>
-              <a:rPr lang="en-US" smtClean="0"/>
+              <a:rPr lang="en-US"/>
               <a:t>Click to edit Master text styles</a:t>
             </a:r>
           </a:p>
@@ -1816,7 +1927,7 @@
             <a:fld id="{87DE6118-2437-4B30-8E3C-4D2BE6020583}" type="datetimeFigureOut">
               <a:rPr lang="en-US" dirty="0"/>
               <a:pPr/>
-              <a:t>12/28/2016</a:t>
+              <a:t>12/4/2019</a:t>
             </a:fld>
             <a:endParaRPr lang="en-US" dirty="0"/>
           </a:p>
@@ -1996,7 +2107,7 @@
           </a:lstStyle>
           <a:p>
             <a:r>
-              <a:rPr lang="en-US" smtClean="0"/>
+              <a:rPr lang="en-US"/>
               <a:t>Click to edit Master title style</a:t>
             </a:r>
             <a:endParaRPr lang="en-US" dirty="0"/>
@@ -2061,35 +2172,35 @@
           <a:p>
             <a:pPr lvl="0"/>
             <a:r>
-              <a:rPr lang="en-US" smtClean="0"/>
+              <a:rPr lang="en-US"/>
               <a:t>Click to edit Master text styles</a:t>
             </a:r>
           </a:p>
           <a:p>
             <a:pPr lvl="1"/>
             <a:r>
-              <a:rPr lang="en-US" smtClean="0"/>
+              <a:rPr lang="en-US"/>
               <a:t>Second level</a:t>
             </a:r>
           </a:p>
           <a:p>
             <a:pPr lvl="2"/>
             <a:r>
-              <a:rPr lang="en-US" smtClean="0"/>
+              <a:rPr lang="en-US"/>
               <a:t>Third level</a:t>
             </a:r>
           </a:p>
           <a:p>
             <a:pPr lvl="3"/>
             <a:r>
-              <a:rPr lang="en-US" smtClean="0"/>
+              <a:rPr lang="en-US"/>
               <a:t>Fourth level</a:t>
             </a:r>
           </a:p>
           <a:p>
             <a:pPr lvl="4"/>
             <a:r>
-              <a:rPr lang="en-US" smtClean="0"/>
+              <a:rPr lang="en-US"/>
               <a:t>Fifth level</a:t>
             </a:r>
             <a:endParaRPr lang="en-US" dirty="0"/>
@@ -2154,35 +2265,35 @@
           <a:p>
             <a:pPr lvl="0"/>
             <a:r>
-              <a:rPr lang="en-US" smtClean="0"/>
+              <a:rPr lang="en-US"/>
               <a:t>Click to edit Master text styles</a:t>
             </a:r>
           </a:p>
           <a:p>
             <a:pPr lvl="1"/>
             <a:r>
-              <a:rPr lang="en-US" smtClean="0"/>
+              <a:rPr lang="en-US"/>
               <a:t>Second level</a:t>
             </a:r>
           </a:p>
           <a:p>
             <a:pPr lvl="2"/>
             <a:r>
-              <a:rPr lang="en-US" smtClean="0"/>
+              <a:rPr lang="en-US"/>
               <a:t>Third level</a:t>
             </a:r>
           </a:p>
           <a:p>
             <a:pPr lvl="3"/>
             <a:r>
-              <a:rPr lang="en-US" smtClean="0"/>
+              <a:rPr lang="en-US"/>
               <a:t>Fourth level</a:t>
             </a:r>
           </a:p>
           <a:p>
             <a:pPr lvl="4"/>
             <a:r>
-              <a:rPr lang="en-US" smtClean="0"/>
+              <a:rPr lang="en-US"/>
               <a:t>Fifth level</a:t>
             </a:r>
             <a:endParaRPr lang="en-US" dirty="0"/>
@@ -2206,7 +2317,7 @@
           <a:p>
             <a:fld id="{87DE6118-2437-4B30-8E3C-4D2BE6020583}" type="datetimeFigureOut">
               <a:rPr lang="en-US" dirty="0"/>
-              <a:t>12/28/2016</a:t>
+              <a:t>12/4/2019</a:t>
             </a:fld>
             <a:endParaRPr lang="en-US" dirty="0"/>
           </a:p>
@@ -2308,7 +2419,7 @@
           </a:lstStyle>
           <a:p>
             <a:r>
-              <a:rPr lang="en-US" smtClean="0"/>
+              <a:rPr lang="en-US"/>
               <a:t>Click to edit Master title style</a:t>
             </a:r>
             <a:endParaRPr lang="en-US" dirty="0"/>
@@ -2389,7 +2500,7 @@
           <a:p>
             <a:pPr lvl="0"/>
             <a:r>
-              <a:rPr lang="en-US" smtClean="0"/>
+              <a:rPr lang="en-US"/>
               <a:t>Click to edit Master text styles</a:t>
             </a:r>
           </a:p>
@@ -2453,35 +2564,35 @@
           <a:p>
             <a:pPr lvl="0"/>
             <a:r>
-              <a:rPr lang="en-US" smtClean="0"/>
+              <a:rPr lang="en-US"/>
               <a:t>Click to edit Master text styles</a:t>
             </a:r>
           </a:p>
           <a:p>
             <a:pPr lvl="1"/>
             <a:r>
-              <a:rPr lang="en-US" smtClean="0"/>
+              <a:rPr lang="en-US"/>
               <a:t>Second level</a:t>
             </a:r>
           </a:p>
           <a:p>
             <a:pPr lvl="2"/>
             <a:r>
-              <a:rPr lang="en-US" smtClean="0"/>
+              <a:rPr lang="en-US"/>
               <a:t>Third level</a:t>
             </a:r>
           </a:p>
           <a:p>
             <a:pPr lvl="3"/>
             <a:r>
-              <a:rPr lang="en-US" smtClean="0"/>
+              <a:rPr lang="en-US"/>
               <a:t>Fourth level</a:t>
             </a:r>
           </a:p>
           <a:p>
             <a:pPr lvl="4"/>
             <a:r>
-              <a:rPr lang="en-US" smtClean="0"/>
+              <a:rPr lang="en-US"/>
               <a:t>Fifth level</a:t>
             </a:r>
             <a:endParaRPr lang="en-US" dirty="0"/>
@@ -2562,7 +2673,7 @@
           <a:p>
             <a:pPr lvl="0"/>
             <a:r>
-              <a:rPr lang="en-US" smtClean="0"/>
+              <a:rPr lang="en-US"/>
               <a:t>Click to edit Master text styles</a:t>
             </a:r>
           </a:p>
@@ -2626,35 +2737,35 @@
           <a:p>
             <a:pPr lvl="0"/>
             <a:r>
-              <a:rPr lang="en-US" smtClean="0"/>
+              <a:rPr lang="en-US"/>
               <a:t>Click to edit Master text styles</a:t>
             </a:r>
           </a:p>
           <a:p>
             <a:pPr lvl="1"/>
             <a:r>
-              <a:rPr lang="en-US" smtClean="0"/>
+              <a:rPr lang="en-US"/>
               <a:t>Second level</a:t>
             </a:r>
           </a:p>
           <a:p>
             <a:pPr lvl="2"/>
             <a:r>
-              <a:rPr lang="en-US" smtClean="0"/>
+              <a:rPr lang="en-US"/>
               <a:t>Third level</a:t>
             </a:r>
           </a:p>
           <a:p>
             <a:pPr lvl="3"/>
             <a:r>
-              <a:rPr lang="en-US" smtClean="0"/>
+              <a:rPr lang="en-US"/>
               <a:t>Fourth level</a:t>
             </a:r>
           </a:p>
           <a:p>
             <a:pPr lvl="4"/>
             <a:r>
-              <a:rPr lang="en-US" smtClean="0"/>
+              <a:rPr lang="en-US"/>
               <a:t>Fifth level</a:t>
             </a:r>
             <a:endParaRPr lang="en-US" dirty="0"/>
@@ -2678,7 +2789,7 @@
           <a:p>
             <a:fld id="{87DE6118-2437-4B30-8E3C-4D2BE6020583}" type="datetimeFigureOut">
               <a:rPr lang="en-US" dirty="0"/>
-              <a:t>12/28/2016</a:t>
+              <a:t>12/4/2019</a:t>
             </a:fld>
             <a:endParaRPr lang="en-US" dirty="0"/>
           </a:p>
@@ -2767,7 +2878,7 @@
           <a:lstStyle/>
           <a:p>
             <a:r>
-              <a:rPr lang="en-US" smtClean="0"/>
+              <a:rPr lang="en-US"/>
               <a:t>Click to edit Master title style</a:t>
             </a:r>
             <a:endParaRPr lang="en-US" dirty="0"/>
@@ -2791,7 +2902,7 @@
           <a:p>
             <a:fld id="{87DE6118-2437-4B30-8E3C-4D2BE6020583}" type="datetimeFigureOut">
               <a:rPr lang="en-US" dirty="0"/>
-              <a:t>12/28/2016</a:t>
+              <a:t>12/4/2019</a:t>
             </a:fld>
             <a:endParaRPr lang="en-US" dirty="0"/>
           </a:p>
@@ -2881,7 +2992,7 @@
           <a:p>
             <a:fld id="{87DE6118-2437-4B30-8E3C-4D2BE6020583}" type="datetimeFigureOut">
               <a:rPr lang="en-US" dirty="0"/>
-              <a:t>12/28/2016</a:t>
+              <a:t>12/4/2019</a:t>
             </a:fld>
             <a:endParaRPr lang="en-US" dirty="0"/>
           </a:p>
@@ -3026,7 +3137,7 @@
           </a:lstStyle>
           <a:p>
             <a:r>
-              <a:rPr lang="en-US" smtClean="0"/>
+              <a:rPr lang="en-US"/>
               <a:t>Click to edit Master title style</a:t>
             </a:r>
             <a:endParaRPr lang="en-US" dirty="0"/>
@@ -3083,35 +3194,35 @@
           <a:p>
             <a:pPr lvl="0"/>
             <a:r>
-              <a:rPr lang="en-US" smtClean="0"/>
+              <a:rPr lang="en-US"/>
               <a:t>Click to edit Master text styles</a:t>
             </a:r>
           </a:p>
           <a:p>
             <a:pPr lvl="1"/>
             <a:r>
-              <a:rPr lang="en-US" smtClean="0"/>
+              <a:rPr lang="en-US"/>
               <a:t>Second level</a:t>
             </a:r>
           </a:p>
           <a:p>
             <a:pPr lvl="2"/>
             <a:r>
-              <a:rPr lang="en-US" smtClean="0"/>
+              <a:rPr lang="en-US"/>
               <a:t>Third level</a:t>
             </a:r>
           </a:p>
           <a:p>
             <a:pPr lvl="3"/>
             <a:r>
-              <a:rPr lang="en-US" smtClean="0"/>
+              <a:rPr lang="en-US"/>
               <a:t>Fourth level</a:t>
             </a:r>
           </a:p>
           <a:p>
             <a:pPr lvl="4"/>
             <a:r>
-              <a:rPr lang="en-US" smtClean="0"/>
+              <a:rPr lang="en-US"/>
               <a:t>Fifth level</a:t>
             </a:r>
             <a:endParaRPr lang="en-US" dirty="0"/>
@@ -3186,7 +3297,7 @@
           <a:p>
             <a:pPr lvl="0"/>
             <a:r>
-              <a:rPr lang="en-US" smtClean="0"/>
+              <a:rPr lang="en-US"/>
               <a:t>Click to edit Master text styles</a:t>
             </a:r>
           </a:p>
@@ -3223,7 +3334,7 @@
             <a:fld id="{87DE6118-2437-4B30-8E3C-4D2BE6020583}" type="datetimeFigureOut">
               <a:rPr lang="en-US" dirty="0"/>
               <a:pPr/>
-              <a:t>12/28/2016</a:t>
+              <a:t>12/4/2019</a:t>
             </a:fld>
             <a:endParaRPr lang="en-US" dirty="0"/>
           </a:p>
@@ -3429,7 +3540,7 @@
           </a:lstStyle>
           <a:p>
             <a:r>
-              <a:rPr lang="en-US" smtClean="0"/>
+              <a:rPr lang="en-US"/>
               <a:t>Click to edit Master title style</a:t>
             </a:r>
             <a:endParaRPr lang="en-US" dirty="0"/>
@@ -3496,7 +3607,7 @@
           </a:lstStyle>
           <a:p>
             <a:r>
-              <a:rPr lang="en-US" smtClean="0"/>
+              <a:rPr lang="en-US"/>
               <a:t>Click icon to add picture</a:t>
             </a:r>
             <a:endParaRPr lang="en-US" dirty="0"/>
@@ -3571,7 +3682,7 @@
           <a:p>
             <a:pPr lvl="0"/>
             <a:r>
-              <a:rPr lang="en-US" smtClean="0"/>
+              <a:rPr lang="en-US"/>
               <a:t>Click to edit Master text styles</a:t>
             </a:r>
           </a:p>
@@ -3608,7 +3719,7 @@
             <a:fld id="{87DE6118-2437-4B30-8E3C-4D2BE6020583}" type="datetimeFigureOut">
               <a:rPr lang="en-US" dirty="0"/>
               <a:pPr/>
-              <a:t>12/28/2016</a:t>
+              <a:t>12/4/2019</a:t>
             </a:fld>
             <a:endParaRPr lang="en-US" dirty="0"/>
           </a:p>
@@ -3787,7 +3898,7 @@
           <a:lstStyle/>
           <a:p>
             <a:r>
-              <a:rPr lang="en-US" smtClean="0"/>
+              <a:rPr lang="en-US"/>
               <a:t>Click to edit Master title style</a:t>
             </a:r>
             <a:endParaRPr lang="en-US" dirty="0"/>
@@ -3821,35 +3932,35 @@
           <a:p>
             <a:pPr lvl="0"/>
             <a:r>
-              <a:rPr lang="en-US" smtClean="0"/>
+              <a:rPr lang="en-US"/>
               <a:t>Click to edit Master text styles</a:t>
             </a:r>
           </a:p>
           <a:p>
             <a:pPr lvl="1"/>
             <a:r>
-              <a:rPr lang="en-US" smtClean="0"/>
+              <a:rPr lang="en-US"/>
               <a:t>Second level</a:t>
             </a:r>
           </a:p>
           <a:p>
             <a:pPr lvl="2"/>
             <a:r>
-              <a:rPr lang="en-US" smtClean="0"/>
+              <a:rPr lang="en-US"/>
               <a:t>Third level</a:t>
             </a:r>
           </a:p>
           <a:p>
             <a:pPr lvl="3"/>
             <a:r>
-              <a:rPr lang="en-US" smtClean="0"/>
+              <a:rPr lang="en-US"/>
               <a:t>Fourth level</a:t>
             </a:r>
           </a:p>
           <a:p>
             <a:pPr lvl="4"/>
             <a:r>
-              <a:rPr lang="en-US" smtClean="0"/>
+              <a:rPr lang="en-US"/>
               <a:t>Fifth level</a:t>
             </a:r>
             <a:endParaRPr lang="en-US" dirty="0"/>
@@ -3890,7 +4001,7 @@
             <a:fld id="{87DE6118-2437-4B30-8E3C-4D2BE6020583}" type="datetimeFigureOut">
               <a:rPr lang="en-US" dirty="0"/>
               <a:pPr/>
-              <a:t>12/28/2016</a:t>
+              <a:t>12/4/2019</a:t>
             </a:fld>
             <a:endParaRPr lang="en-US" dirty="0"/>
           </a:p>
@@ -4332,7 +4443,7 @@
       </a:lvl9pPr>
     </p:otherStyle>
   </p:txStyles>
-  <p:extLst mod="1">
+  <p:extLst>
     <p:ext uri="{27BBF7A9-308A-43DC-89C8-2F10F3537804}">
       <p15:sldGuideLst xmlns:p15="http://schemas.microsoft.com/office/powerpoint/2012/main">
         <p15:guide id="3" orient="horz" pos="1368">
@@ -4414,25 +4525,22 @@
           <a:lstStyle/>
           <a:p>
             <a:r>
-              <a:rPr lang="en-US" dirty="0" smtClean="0">
+              <a:rPr lang="en-US" dirty="0">
                 <a:latin typeface="Algerian" panose="04020705040A02060702" pitchFamily="82" charset="0"/>
               </a:rPr>
               <a:t>From MTV,</a:t>
             </a:r>
             <a:br>
-              <a:rPr lang="en-US" dirty="0" smtClean="0">
+              <a:rPr lang="en-US" dirty="0">
                 <a:latin typeface="Algerian" panose="04020705040A02060702" pitchFamily="82" charset="0"/>
               </a:rPr>
             </a:br>
             <a:r>
-              <a:rPr lang="en-US" dirty="0" smtClean="0">
+              <a:rPr lang="en-US" dirty="0">
                 <a:latin typeface="Algerian" panose="04020705040A02060702" pitchFamily="82" charset="0"/>
               </a:rPr>
               <a:t>Back to politics</a:t>
             </a:r>
-            <a:endParaRPr lang="en-US" dirty="0">
-              <a:latin typeface="Algerian" panose="04020705040A02060702" pitchFamily="82" charset="0"/>
-            </a:endParaRPr>
           </a:p>
         </p:txBody>
       </p:sp>
@@ -4454,14 +4562,17 @@
           <a:lstStyle/>
           <a:p>
             <a:r>
-              <a:rPr lang="en-US" sz="6000" dirty="0" smtClean="0">
+              <a:rPr lang="en-US" sz="6000" dirty="0">
                 <a:latin typeface="Algerian" panose="04020705040A02060702" pitchFamily="82" charset="0"/>
               </a:rPr>
-              <a:t>1980s</a:t>
-            </a:r>
-            <a:endParaRPr lang="en-US" sz="6000" dirty="0">
-              <a:latin typeface="Algerian" panose="04020705040A02060702" pitchFamily="82" charset="0"/>
-            </a:endParaRPr>
+              <a:t>1980</a:t>
+            </a:r>
+            <a:r>
+              <a:rPr lang="en-US" sz="3200" dirty="0">
+                <a:latin typeface="Algerian" panose="04020705040A02060702" pitchFamily="82" charset="0"/>
+              </a:rPr>
+              <a:t>s</a:t>
+            </a:r>
           </a:p>
         </p:txBody>
       </p:sp>
@@ -4475,13 +4586,6 @@
   <p:clrMapOvr>
     <a:masterClrMapping/>
   </p:clrMapOvr>
-  <p:timing>
-    <p:tnLst>
-      <p:par>
-        <p:cTn id="1" dur="indefinite" restart="never" nodeType="tmRoot"/>
-      </p:par>
-    </p:tnLst>
-  </p:timing>
 </p:sld>
 </file>
 
@@ -4525,20 +4629,17 @@
           <a:lstStyle/>
           <a:p>
             <a:r>
-              <a:rPr lang="en-US" sz="7200" b="1" i="1" dirty="0" smtClean="0">
+              <a:rPr lang="en-US" sz="7200" b="1" i="1" dirty="0">
                 <a:latin typeface="Algerian" panose="04020705040A02060702" pitchFamily="82" charset="0"/>
               </a:rPr>
               <a:t>Queen</a:t>
             </a:r>
             <a:r>
-              <a:rPr lang="en-US" sz="5400" i="1" dirty="0" smtClean="0">
+              <a:rPr lang="en-US" sz="5400" i="1" dirty="0">
                 <a:latin typeface="Algerian" panose="04020705040A02060702" pitchFamily="82" charset="0"/>
               </a:rPr>
               <a:t>, 1970-1991, 1995…</a:t>
             </a:r>
-            <a:endParaRPr lang="en-US" sz="5400" i="1" dirty="0">
-              <a:latin typeface="Algerian" panose="04020705040A02060702" pitchFamily="82" charset="0"/>
-            </a:endParaRPr>
           </a:p>
         </p:txBody>
       </p:sp>
@@ -4565,35 +4666,23 @@
           <a:lstStyle/>
           <a:p>
             <a:r>
-              <a:rPr lang="en-US" sz="2400" b="1" dirty="0" smtClean="0">
-                <a:latin typeface="Agency FB" panose="020B0503020202020204" pitchFamily="34" charset="0"/>
-              </a:rPr>
-              <a:t>Brian May (guitars)</a:t>
-            </a:r>
-          </a:p>
-          <a:p>
-            <a:r>
-              <a:rPr lang="en-US" sz="2400" b="1" dirty="0" smtClean="0">
-                <a:latin typeface="Agency FB" panose="020B0503020202020204" pitchFamily="34" charset="0"/>
-              </a:rPr>
-              <a:t>Freddie Mercury (</a:t>
-            </a:r>
-            <a:r>
               <a:rPr lang="en-US" sz="2400" b="1" dirty="0">
                 <a:latin typeface="Agency FB" panose="020B0503020202020204" pitchFamily="34" charset="0"/>
               </a:rPr>
-              <a:t>Farrokh </a:t>
-            </a:r>
-            <a:r>
-              <a:rPr lang="en-US" sz="2400" b="1" dirty="0" smtClean="0">
+              <a:t>Brian May (guitars)</a:t>
+            </a:r>
+          </a:p>
+          <a:p>
+            <a:r>
+              <a:rPr lang="en-US" sz="2400" b="1" dirty="0">
                 <a:latin typeface="Agency FB" panose="020B0503020202020204" pitchFamily="34" charset="0"/>
               </a:rPr>
-              <a:t>Bulsara), vocals, main songwriter</a:t>
-            </a:r>
-          </a:p>
-          <a:p>
-            <a:r>
-              <a:rPr lang="en-US" sz="2400" b="1" dirty="0" smtClean="0">
+              <a:t>Freddie Mercury (Farrokh Bulsara), vocals, main songwriter</a:t>
+            </a:r>
+          </a:p>
+          <a:p>
+            <a:r>
+              <a:rPr lang="en-US" sz="2400" b="1" dirty="0">
                 <a:latin typeface="Agency FB" panose="020B0503020202020204" pitchFamily="34" charset="0"/>
               </a:rPr>
               <a:t>John Deacon (bass guitar)</a:t>
@@ -4601,7 +4690,7 @@
           </a:p>
           <a:p>
             <a:r>
-              <a:rPr lang="en-US" sz="2400" b="1" dirty="0" smtClean="0">
+              <a:rPr lang="en-US" sz="2400" b="1" dirty="0">
                 <a:latin typeface="Agency FB" panose="020B0503020202020204" pitchFamily="34" charset="0"/>
               </a:rPr>
               <a:t>Roger Taylor (drums)</a:t>
@@ -4609,7 +4698,7 @@
           </a:p>
           <a:p>
             <a:r>
-              <a:rPr lang="en-US" sz="2400" b="1" dirty="0" smtClean="0">
+              <a:rPr lang="en-US" sz="2400" b="1" dirty="0">
                 <a:latin typeface="Agency FB" panose="020B0503020202020204" pitchFamily="34" charset="0"/>
               </a:rPr>
               <a:t>Initially, progressive rock with some heavy metal influences.</a:t>
@@ -4617,19 +4706,19 @@
           </a:p>
           <a:p>
             <a:r>
-              <a:rPr lang="en-US" sz="2400" b="1" dirty="0" smtClean="0">
+              <a:rPr lang="en-US" sz="2400" b="1" dirty="0">
                 <a:latin typeface="Agency FB" panose="020B0503020202020204" pitchFamily="34" charset="0"/>
               </a:rPr>
               <a:t>First major album, </a:t>
             </a:r>
             <a:r>
-              <a:rPr lang="en-US" sz="2400" b="1" i="1" dirty="0" smtClean="0">
+              <a:rPr lang="en-US" sz="2400" b="1" i="1" dirty="0">
                 <a:latin typeface="Agency FB" panose="020B0503020202020204" pitchFamily="34" charset="0"/>
               </a:rPr>
               <a:t>Sheer Heart Attack</a:t>
             </a:r>
             <a:r>
-              <a:rPr lang="en-US" sz="2400" b="1" dirty="0" smtClean="0">
+              <a:rPr lang="en-US" sz="2400" b="1" dirty="0">
                 <a:latin typeface="Agency FB" panose="020B0503020202020204" pitchFamily="34" charset="0"/>
               </a:rPr>
               <a:t>, 1974, with single “Killer Queen”.</a:t>
@@ -4637,19 +4726,19 @@
           </a:p>
           <a:p>
             <a:r>
-              <a:rPr lang="en-US" sz="2400" b="1" dirty="0" smtClean="0">
+              <a:rPr lang="en-US" sz="2400" b="1" dirty="0">
                 <a:latin typeface="Agency FB" panose="020B0503020202020204" pitchFamily="34" charset="0"/>
               </a:rPr>
               <a:t>1975: </a:t>
             </a:r>
             <a:r>
-              <a:rPr lang="en-US" sz="2400" b="1" i="1" dirty="0" smtClean="0">
+              <a:rPr lang="en-US" sz="2400" b="1" i="1" dirty="0">
                 <a:latin typeface="Agency FB" panose="020B0503020202020204" pitchFamily="34" charset="0"/>
               </a:rPr>
               <a:t>Night at the Opera</a:t>
             </a:r>
             <a:r>
-              <a:rPr lang="en-US" sz="2400" b="1" dirty="0" smtClean="0">
+              <a:rPr lang="en-US" sz="2400" b="1" dirty="0">
                 <a:latin typeface="Agency FB" panose="020B0503020202020204" pitchFamily="34" charset="0"/>
               </a:rPr>
               <a:t>, with single “Bohemian Rhapsody”.</a:t>
@@ -4713,13 +4802,6 @@
   <p:clrMapOvr>
     <a:masterClrMapping/>
   </p:clrMapOvr>
-  <p:timing>
-    <p:tnLst>
-      <p:par>
-        <p:cTn id="1" dur="indefinite" restart="never" nodeType="tmRoot"/>
-      </p:par>
-    </p:tnLst>
-  </p:timing>
 </p:sld>
 </file>
 
@@ -4763,20 +4845,17 @@
           <a:lstStyle/>
           <a:p>
             <a:r>
-              <a:rPr lang="en-US" sz="7200" b="1" i="1" dirty="0" smtClean="0">
+              <a:rPr lang="en-US" sz="7200" b="1" i="1" dirty="0">
                 <a:latin typeface="Algerian" panose="04020705040A02060702" pitchFamily="82" charset="0"/>
               </a:rPr>
               <a:t>Queen</a:t>
             </a:r>
             <a:r>
-              <a:rPr lang="en-US" sz="5400" i="1" dirty="0" smtClean="0">
+              <a:rPr lang="en-US" sz="5400" i="1" dirty="0">
                 <a:latin typeface="Algerian" panose="04020705040A02060702" pitchFamily="82" charset="0"/>
               </a:rPr>
               <a:t>, 1970-1991, 1995…</a:t>
             </a:r>
-            <a:endParaRPr lang="en-US" sz="5400" i="1" dirty="0">
-              <a:latin typeface="Algerian" panose="04020705040A02060702" pitchFamily="82" charset="0"/>
-            </a:endParaRPr>
           </a:p>
         </p:txBody>
       </p:sp>
@@ -4803,44 +4882,34 @@
           <a:lstStyle/>
           <a:p>
             <a:r>
-              <a:rPr lang="en-US" sz="2400" dirty="0" smtClean="0"/>
+              <a:rPr lang="en-US" sz="2400" dirty="0"/>
               <a:t>Amazing live performances</a:t>
             </a:r>
           </a:p>
           <a:p>
             <a:r>
               <a:rPr lang="en-US" sz="2400" dirty="0"/>
-              <a:t>T</a:t>
-            </a:r>
-            <a:r>
-              <a:rPr lang="en-US" sz="2400" dirty="0" smtClean="0"/>
-              <a:t>oured South America, Australia, Japan, willing to go anywhere to play.</a:t>
-            </a:r>
-          </a:p>
-          <a:p>
-            <a:r>
-              <a:rPr lang="en-US" sz="2400" dirty="0" smtClean="0"/>
+              <a:t>Toured South America, Australia, Japan, willing to go anywhere to play.</a:t>
+            </a:r>
+          </a:p>
+          <a:p>
+            <a:r>
+              <a:rPr lang="en-US" sz="2400" dirty="0"/>
               <a:t>13 July 1985, Live Aid performance:</a:t>
             </a:r>
           </a:p>
           <a:p>
             <a:r>
-              <a:rPr lang="en-US" sz="2400" dirty="0">
+              <a:rPr lang="en-CA" sz="2400" dirty="0">
                 <a:hlinkClick r:id="rId2"/>
               </a:rPr>
-              <a:t>https://</a:t>
-            </a:r>
-            <a:r>
-              <a:rPr lang="en-US" sz="2400" dirty="0" smtClean="0">
-                <a:hlinkClick r:id="rId2"/>
-              </a:rPr>
-              <a:t>www.youtube.com/watch?v=A22oy8dFjqc</a:t>
-            </a:r>
-            <a:endParaRPr lang="en-US" sz="2400" dirty="0" smtClean="0"/>
-          </a:p>
-          <a:p>
-            <a:r>
-              <a:rPr lang="en-US" sz="2400" dirty="0" smtClean="0"/>
+              <a:t>https://www.youtube.com/watch?v=TkFHYODzRTs</a:t>
+            </a:r>
+            <a:endParaRPr lang="en-CA" sz="2400" dirty="0"/>
+          </a:p>
+          <a:p>
+            <a:r>
+              <a:rPr lang="en-US" sz="2400" dirty="0"/>
               <a:t>1986, Budapest, behind the Iron Curtain:</a:t>
             </a:r>
           </a:p>
@@ -4849,23 +4918,17 @@
               <a:rPr lang="en-US" sz="2400" dirty="0">
                 <a:hlinkClick r:id="rId3"/>
               </a:rPr>
-              <a:t>https://</a:t>
-            </a:r>
-            <a:r>
-              <a:rPr lang="en-US" sz="2400" dirty="0" smtClean="0">
-                <a:hlinkClick r:id="rId3"/>
-              </a:rPr>
-              <a:t>www.youtube.com/watch?v=iCV3mqiPluA&amp;list=RDLVwtLT9D9Pk&amp;index=3</a:t>
-            </a:r>
-            <a:endParaRPr lang="en-US" sz="2400" dirty="0" smtClean="0"/>
-          </a:p>
-          <a:p>
-            <a:r>
-              <a:rPr lang="en-US" sz="2400" dirty="0" smtClean="0"/>
+              <a:t>https://www.youtube.com/watch?v=iCV3mqiPluA&amp;list=RDLVwtLT9D9Pk&amp;index=3</a:t>
+            </a:r>
+            <a:endParaRPr lang="en-US" sz="2400" dirty="0"/>
+          </a:p>
+          <a:p>
+            <a:r>
+              <a:rPr lang="en-US" sz="2400" dirty="0"/>
               <a:t>1990: </a:t>
             </a:r>
             <a:r>
-              <a:rPr lang="en-US" sz="2400" i="1" dirty="0" smtClean="0"/>
+              <a:rPr lang="en-US" sz="2400" i="1" dirty="0"/>
               <a:t>Innuendo</a:t>
             </a:r>
             <a:r>
@@ -4876,19 +4939,13 @@
               <a:rPr lang="en-US" sz="2400" dirty="0">
                 <a:hlinkClick r:id="rId4"/>
               </a:rPr>
-              <a:t>https://</a:t>
-            </a:r>
-            <a:r>
-              <a:rPr lang="en-US" sz="2400" dirty="0" smtClean="0">
-                <a:hlinkClick r:id="rId4"/>
-              </a:rPr>
-              <a:t>www.youtube.com/watch?v=g2N0TkfrQhY</a:t>
-            </a:r>
-            <a:endParaRPr lang="en-US" sz="2400" dirty="0" smtClean="0"/>
-          </a:p>
-          <a:p>
-            <a:r>
-              <a:rPr lang="en-US" sz="2400" dirty="0" smtClean="0"/>
+              <a:t>https://www.youtube.com/watch?v=g2N0TkfrQhY</a:t>
+            </a:r>
+            <a:endParaRPr lang="en-US" sz="2400" dirty="0"/>
+          </a:p>
+          <a:p>
+            <a:r>
+              <a:rPr lang="en-US" sz="2400" dirty="0"/>
               <a:t>November 1991, Freddie Mercury died of complications from AIDS.</a:t>
             </a:r>
           </a:p>
@@ -4904,13 +4961,6 @@
   <p:clrMapOvr>
     <a:masterClrMapping/>
   </p:clrMapOvr>
-  <p:timing>
-    <p:tnLst>
-      <p:par>
-        <p:cTn id="1" dur="indefinite" restart="never" nodeType="tmRoot"/>
-      </p:par>
-    </p:tnLst>
-  </p:timing>
 </p:sld>
 </file>
 
@@ -4952,10 +5002,9 @@
           <a:lstStyle/>
           <a:p>
             <a:r>
-              <a:rPr lang="en-US" b="1" dirty="0" smtClean="0"/>
+              <a:rPr lang="en-US" b="1" dirty="0"/>
               <a:t>End of Communism in Europe, 1989-1991</a:t>
             </a:r>
-            <a:endParaRPr lang="en-US" b="1" dirty="0"/>
           </a:p>
         </p:txBody>
       </p:sp>
@@ -4980,7 +5029,7 @@
           <a:lstStyle/>
           <a:p>
             <a:r>
-              <a:rPr lang="en-US" dirty="0" smtClean="0"/>
+              <a:rPr lang="en-US" dirty="0"/>
               <a:t>1990: Jesus Jones, “Right here, right now”:</a:t>
             </a:r>
           </a:p>
@@ -4989,15 +5038,9 @@
               <a:rPr lang="en-US" dirty="0">
                 <a:hlinkClick r:id="rId2"/>
               </a:rPr>
-              <a:t>https://</a:t>
-            </a:r>
-            <a:r>
-              <a:rPr lang="en-US" dirty="0" smtClean="0">
-                <a:hlinkClick r:id="rId2"/>
-              </a:rPr>
-              <a:t>www.youtube.com/watch?v=lwpjsToHzAE</a:t>
-            </a:r>
-            <a:endParaRPr lang="en-US" dirty="0" smtClean="0"/>
+              <a:t>https://www.youtube.com/watch?v=lwpjsToHzAE</a:t>
+            </a:r>
+            <a:endParaRPr lang="en-US" dirty="0"/>
           </a:p>
           <a:p>
             <a:endParaRPr lang="en-US" dirty="0"/>
@@ -5044,13 +5087,6 @@
   <p:clrMapOvr>
     <a:masterClrMapping/>
   </p:clrMapOvr>
-  <p:timing>
-    <p:tnLst>
-      <p:par>
-        <p:cTn id="1" dur="indefinite" restart="never" nodeType="tmRoot"/>
-      </p:par>
-    </p:tnLst>
-  </p:timing>
 </p:sld>
 </file>
 
@@ -5092,10 +5128,9 @@
           <a:lstStyle/>
           <a:p>
             <a:r>
-              <a:rPr lang="en-US" b="1" dirty="0" smtClean="0"/>
+              <a:rPr lang="en-US" b="1" dirty="0"/>
               <a:t>Grunge, 1985-1995</a:t>
             </a:r>
-            <a:endParaRPr lang="en-US" b="1" dirty="0"/>
           </a:p>
         </p:txBody>
       </p:sp>
@@ -5122,48 +5157,48 @@
           <a:lstStyle/>
           <a:p>
             <a:r>
-              <a:rPr lang="en-US" b="1" dirty="0" smtClean="0"/>
+              <a:rPr lang="en-US" b="1" dirty="0"/>
               <a:t>Based in Washington state, mostly Seattle:</a:t>
             </a:r>
           </a:p>
           <a:p>
             <a:r>
-              <a:rPr lang="en-US" b="1" dirty="0" smtClean="0"/>
+              <a:rPr lang="en-US" b="1" dirty="0"/>
               <a:t>Record label: Sub Pop</a:t>
             </a:r>
           </a:p>
           <a:p>
             <a:r>
-              <a:rPr lang="en-US" b="1" dirty="0" smtClean="0"/>
+              <a:rPr lang="en-US" b="1" dirty="0"/>
               <a:t>Songs about teenage angst, alienation, apathy, confinement, rebellion</a:t>
             </a:r>
           </a:p>
           <a:p>
             <a:r>
-              <a:rPr lang="en-US" b="1" dirty="0" err="1" smtClean="0"/>
+              <a:rPr lang="en-US" b="1" dirty="0" err="1"/>
               <a:t>Soundgarden</a:t>
             </a:r>
             <a:r>
-              <a:rPr lang="en-US" b="1" dirty="0" smtClean="0"/>
+              <a:rPr lang="en-US" b="1" dirty="0"/>
               <a:t>, 1984-1997: Chris Cornell (guitar and vocals), Kim </a:t>
             </a:r>
             <a:r>
-              <a:rPr lang="en-US" b="1" dirty="0" err="1" smtClean="0"/>
+              <a:rPr lang="en-US" b="1" dirty="0" err="1"/>
               <a:t>Thayill</a:t>
             </a:r>
             <a:r>
-              <a:rPr lang="en-US" b="1" dirty="0" smtClean="0"/>
+              <a:rPr lang="en-US" b="1" dirty="0"/>
               <a:t> (lead guitar), Hiro Yamamoto (bass), Matt Cameron (drums)</a:t>
             </a:r>
           </a:p>
           <a:p>
             <a:pPr lvl="1"/>
             <a:r>
-              <a:rPr lang="en-US" b="1" dirty="0" err="1" smtClean="0"/>
+              <a:rPr lang="en-US" b="1" dirty="0" err="1"/>
               <a:t>Superunknown</a:t>
             </a:r>
             <a:r>
-              <a:rPr lang="en-US" b="1" dirty="0" smtClean="0"/>
+              <a:rPr lang="en-US" b="1" dirty="0"/>
               <a:t>, “Black Hole Sun”, 1994</a:t>
             </a:r>
           </a:p>
@@ -5173,55 +5208,57 @@
               <a:rPr lang="en-US" b="1" dirty="0">
                 <a:hlinkClick r:id="rId2"/>
               </a:rPr>
-              <a:t>https://</a:t>
-            </a:r>
-            <a:r>
-              <a:rPr lang="en-US" b="1" dirty="0" smtClean="0">
-                <a:hlinkClick r:id="rId2"/>
-              </a:rPr>
-              <a:t>www.youtube.com/watch?v=TZThOsCv2Mw</a:t>
+              <a:t>https://www.youtube.com/watch?v=TZThOsCv2Mw</a:t>
             </a:r>
             <a:endParaRPr lang="en-US" b="1" dirty="0"/>
           </a:p>
           <a:p>
             <a:r>
-              <a:rPr lang="en-US" b="1" dirty="0" smtClean="0"/>
+              <a:rPr lang="en-US" b="1" dirty="0"/>
               <a:t>Nirvana, 1987-1994: Kurt Cobain (guitar, song-writer, vocals), </a:t>
             </a:r>
             <a:r>
-              <a:rPr lang="en-US" b="1" dirty="0" err="1" smtClean="0"/>
+              <a:rPr lang="en-US" b="1" dirty="0" err="1"/>
               <a:t>Krist</a:t>
             </a:r>
             <a:r>
-              <a:rPr lang="en-US" b="1" dirty="0" smtClean="0"/>
+              <a:rPr lang="en-US" b="1" dirty="0"/>
               <a:t> </a:t>
             </a:r>
             <a:r>
-              <a:rPr lang="en-US" b="1" dirty="0" err="1" smtClean="0"/>
+              <a:rPr lang="en-US" b="1" dirty="0" err="1"/>
               <a:t>Novoselic</a:t>
             </a:r>
             <a:r>
-              <a:rPr lang="en-US" b="1" dirty="0" smtClean="0"/>
+              <a:rPr lang="en-US" b="1" dirty="0"/>
               <a:t> (bass), Chad Channing (drums for Bleach), then David </a:t>
             </a:r>
             <a:r>
-              <a:rPr lang="en-US" b="1" dirty="0" err="1" smtClean="0"/>
+              <a:rPr lang="en-US" b="1" dirty="0" err="1"/>
               <a:t>Grohl</a:t>
             </a:r>
             <a:r>
-              <a:rPr lang="en-US" b="1" dirty="0" smtClean="0"/>
+              <a:rPr lang="en-US" b="1" dirty="0"/>
               <a:t> (drums for rest of existence).</a:t>
             </a:r>
           </a:p>
           <a:p>
             <a:pPr lvl="1"/>
             <a:r>
-              <a:rPr lang="en-US" b="1" dirty="0" err="1" smtClean="0"/>
+              <a:rPr lang="en-US" b="1" dirty="0" err="1"/>
               <a:t>Nevermind</a:t>
             </a:r>
             <a:r>
-              <a:rPr lang="en-US" b="1" dirty="0" smtClean="0"/>
-              <a:t> (1991), “Smells like teen spirit”, “Come as you are,” “Lithium,” and “In Bloom”.</a:t>
+              <a:rPr lang="en-US" b="1" dirty="0"/>
+              <a:t> (1991), “Smells like teen spirit” </a:t>
+            </a:r>
+            <a:r>
+              <a:rPr lang="en-US" b="1"/>
+              <a:t>(Pixies Rip-off), </a:t>
+            </a:r>
+            <a:r>
+              <a:rPr lang="en-US" b="1" dirty="0"/>
+              <a:t>“Come as you are,” “Lithium,” and “In Bloom”.</a:t>
             </a:r>
           </a:p>
           <a:p>
@@ -5230,22 +5267,15 @@
               <a:rPr lang="en-US" b="1" dirty="0">
                 <a:hlinkClick r:id="rId3"/>
               </a:rPr>
-              <a:t>https://</a:t>
-            </a:r>
-            <a:r>
-              <a:rPr lang="en-US" b="1" dirty="0" smtClean="0">
-                <a:hlinkClick r:id="rId3"/>
-              </a:rPr>
-              <a:t>www.youtube.com/watch?v=zYxkezUr8MQ</a:t>
+              <a:t>https://www.youtube.com/watch?v=zYxkezUr8MQ</a:t>
             </a:r>
             <a:endParaRPr lang="en-US" b="1" dirty="0"/>
           </a:p>
           <a:p>
             <a:r>
-              <a:rPr lang="en-US" b="1" dirty="0" smtClean="0"/>
+              <a:rPr lang="en-US" b="1" dirty="0"/>
               <a:t>Pearl Jam, Alice in Chains, Stone Temple Pilots</a:t>
             </a:r>
-            <a:endParaRPr lang="en-US" b="1" dirty="0"/>
           </a:p>
           <a:p>
             <a:endParaRPr lang="en-US" b="1" dirty="0"/>
@@ -5262,13 +5292,6 @@
   <p:clrMapOvr>
     <a:masterClrMapping/>
   </p:clrMapOvr>
-  <p:timing>
-    <p:tnLst>
-      <p:par>
-        <p:cTn id="1" dur="indefinite" restart="never" nodeType="tmRoot"/>
-      </p:par>
-    </p:tnLst>
-  </p:timing>
 </p:sld>
 </file>
 
@@ -5313,10 +5336,9 @@
           <a:p>
             <a:pPr algn="ctr"/>
             <a:r>
-              <a:rPr lang="en-US" b="1" dirty="0" smtClean="0"/>
+              <a:rPr lang="en-US" b="1" dirty="0"/>
               <a:t>Decline of Record sales world wide</a:t>
             </a:r>
-            <a:endParaRPr lang="en-US" b="1" dirty="0"/>
           </a:p>
         </p:txBody>
       </p:sp>
@@ -5359,13 +5381,6 @@
   <p:clrMapOvr>
     <a:masterClrMapping/>
   </p:clrMapOvr>
-  <p:timing>
-    <p:tnLst>
-      <p:par>
-        <p:cTn id="1" dur="indefinite" restart="never" nodeType="tmRoot"/>
-      </p:par>
-    </p:tnLst>
-  </p:timing>
 </p:sld>
 </file>
 
@@ -5410,10 +5425,9 @@
           <a:p>
             <a:pPr algn="ctr"/>
             <a:r>
-              <a:rPr lang="en-US" b="1" dirty="0" smtClean="0"/>
+              <a:rPr lang="en-US" b="1" dirty="0"/>
               <a:t>Causes of Decline of Record sales world wide</a:t>
             </a:r>
-            <a:endParaRPr lang="en-US" b="1" dirty="0"/>
           </a:p>
         </p:txBody>
       </p:sp>
@@ -5440,47 +5454,35 @@
           <a:lstStyle/>
           <a:p>
             <a:r>
-              <a:rPr lang="en-US" sz="2800" dirty="0" smtClean="0"/>
+              <a:rPr lang="en-US" sz="2800" dirty="0"/>
               <a:t>Other entertainment outlets:</a:t>
             </a:r>
           </a:p>
           <a:p>
             <a:r>
-              <a:rPr lang="en-US" sz="2800" dirty="0" smtClean="0"/>
+              <a:rPr lang="en-US" sz="2800" dirty="0"/>
               <a:t>Video games, cell phones</a:t>
             </a:r>
           </a:p>
           <a:p>
             <a:r>
-              <a:rPr lang="en-US" sz="2800" dirty="0" smtClean="0"/>
-              <a:t>CD burning of </a:t>
-            </a:r>
-            <a:r>
-              <a:rPr lang="en-US" sz="2800" dirty="0" smtClean="0"/>
-              <a:t>albums (started earlier with cassette tapes)</a:t>
-            </a:r>
-            <a:endParaRPr lang="en-US" sz="2800" dirty="0" smtClean="0"/>
-          </a:p>
-          <a:p>
-            <a:r>
-              <a:rPr lang="en-US" sz="2800" dirty="0" smtClean="0"/>
+              <a:rPr lang="en-US" sz="2800" dirty="0"/>
+              <a:t>CD burning of albums (started earlier with cassette tapes)</a:t>
+            </a:r>
+          </a:p>
+          <a:p>
+            <a:r>
+              <a:rPr lang="en-US" sz="2800" dirty="0"/>
               <a:t>P2P sharing (</a:t>
             </a:r>
             <a:r>
-              <a:rPr lang="en-US" sz="2800" dirty="0" err="1" smtClean="0"/>
+              <a:rPr lang="en-US" sz="2800" dirty="0" err="1"/>
               <a:t>bittorrent</a:t>
             </a:r>
             <a:r>
-              <a:rPr lang="en-US" sz="2800" dirty="0" smtClean="0"/>
+              <a:rPr lang="en-US" sz="2800" dirty="0"/>
               <a:t>)</a:t>
             </a:r>
-          </a:p>
-          <a:p>
-            <a:r>
-              <a:rPr lang="en-US" sz="2800" dirty="0" smtClean="0"/>
-              <a:t>Youth unemployment</a:t>
-            </a:r>
-            <a:endParaRPr lang="en-US" sz="2800" dirty="0"/>
           </a:p>
         </p:txBody>
       </p:sp>
@@ -5494,13 +5496,6 @@
   <p:clrMapOvr>
     <a:masterClrMapping/>
   </p:clrMapOvr>
-  <p:timing>
-    <p:tnLst>
-      <p:par>
-        <p:cTn id="1" dur="indefinite" restart="never" nodeType="tmRoot"/>
-      </p:par>
-    </p:tnLst>
-  </p:timing>
 </p:sld>
 </file>
 
@@ -5542,10 +5537,9 @@
           <a:lstStyle/>
           <a:p>
             <a:r>
-              <a:rPr lang="en-US" dirty="0" smtClean="0"/>
+              <a:rPr lang="en-US" dirty="0"/>
               <a:t>More recent developments….</a:t>
             </a:r>
-            <a:endParaRPr lang="en-US" dirty="0"/>
           </a:p>
         </p:txBody>
       </p:sp>
@@ -5572,94 +5566,73 @@
           <a:lstStyle/>
           <a:p>
             <a:r>
-              <a:rPr lang="en-US" dirty="0" smtClean="0"/>
+              <a:rPr lang="en-US" dirty="0"/>
               <a:t>1979, Usenet began some file sharing, especially after linked to ARPANET.</a:t>
             </a:r>
           </a:p>
           <a:p>
             <a:r>
-              <a:rPr lang="en-US" dirty="0" smtClean="0"/>
+              <a:rPr lang="en-US" dirty="0"/>
               <a:t>1991: World Wide Web</a:t>
             </a:r>
           </a:p>
           <a:p>
             <a:r>
-              <a:rPr lang="en-US" dirty="0" smtClean="0"/>
-              <a:t>Napster, from June </a:t>
-            </a:r>
-            <a:r>
               <a:rPr lang="en-US" dirty="0"/>
-              <a:t>1999 </a:t>
-            </a:r>
-            <a:r>
-              <a:rPr lang="en-US" dirty="0" smtClean="0"/>
-              <a:t>to July 2001, </a:t>
-            </a:r>
-          </a:p>
-          <a:p>
-            <a:r>
-              <a:rPr lang="en-US" dirty="0" smtClean="0"/>
+              <a:t>Napster, from June 1999 to July 2001, </a:t>
+            </a:r>
+          </a:p>
+          <a:p>
+            <a:r>
+              <a:rPr lang="en-US" dirty="0"/>
               <a:t>P2P (peer-to-peer) shared mp3 files, undermined albums/CDs.</a:t>
             </a:r>
           </a:p>
           <a:p>
             <a:r>
               <a:rPr lang="en-US" dirty="0"/>
-              <a:t>At its </a:t>
-            </a:r>
-            <a:r>
-              <a:rPr lang="en-US" dirty="0" smtClean="0"/>
-              <a:t>peak, about </a:t>
-            </a:r>
+              <a:t>At its peak, about 80 million registered users.</a:t>
+            </a:r>
+          </a:p>
+          <a:p>
             <a:r>
               <a:rPr lang="en-US" dirty="0"/>
-              <a:t>80 million registered </a:t>
-            </a:r>
-            <a:r>
-              <a:rPr lang="en-US" dirty="0" smtClean="0"/>
-              <a:t>users.</a:t>
-            </a:r>
-          </a:p>
-          <a:p>
-            <a:r>
-              <a:rPr lang="en-US" dirty="0" smtClean="0"/>
               <a:t>Metallica, “I Disappear”, circulated before released. Sued Napster.</a:t>
             </a:r>
           </a:p>
           <a:p>
             <a:r>
-              <a:rPr lang="en-US" dirty="0" err="1" smtClean="0"/>
+              <a:rPr lang="en-US" dirty="0" err="1"/>
               <a:t>Limewire</a:t>
             </a:r>
             <a:r>
-              <a:rPr lang="en-US" dirty="0" smtClean="0"/>
+              <a:rPr lang="en-US" dirty="0"/>
               <a:t>, 2000-2010</a:t>
             </a:r>
           </a:p>
           <a:p>
             <a:r>
-              <a:rPr lang="en-US" dirty="0" err="1" smtClean="0"/>
+              <a:rPr lang="en-US" dirty="0" err="1"/>
               <a:t>Bittorrent</a:t>
             </a:r>
             <a:r>
-              <a:rPr lang="en-US" dirty="0" smtClean="0"/>
+              <a:rPr lang="en-US" dirty="0"/>
               <a:t> persisted, especially </a:t>
             </a:r>
             <a:r>
-              <a:rPr lang="en-US" dirty="0" err="1" smtClean="0"/>
+              <a:rPr lang="en-US" dirty="0" err="1"/>
               <a:t>Piratebay</a:t>
             </a:r>
             <a:r>
-              <a:rPr lang="en-US" dirty="0" smtClean="0"/>
+              <a:rPr lang="en-US" dirty="0"/>
               <a:t>.</a:t>
             </a:r>
           </a:p>
           <a:p>
             <a:r>
-              <a:rPr lang="en-US" dirty="0" smtClean="0"/>
+              <a:rPr lang="en-US" dirty="0"/>
               <a:t>Steve Jobs, iTunes (2001 to present), better than nothing argument.</a:t>
             </a:r>
-            <a:endParaRPr lang="en-US" dirty="0"/>
           </a:p>
         </p:txBody>
       </p:sp>
@@ -5721,13 +5694,6 @@
   <p:clrMapOvr>
     <a:masterClrMapping/>
   </p:clrMapOvr>
-  <p:timing>
-    <p:tnLst>
-      <p:par>
-        <p:cTn id="1" dur="indefinite" restart="never" nodeType="tmRoot"/>
-      </p:par>
-    </p:tnLst>
-  </p:timing>
 </p:sld>
 </file>
 
@@ -5769,14 +5735,11 @@
           <a:lstStyle/>
           <a:p>
             <a:r>
-              <a:rPr lang="en-US" dirty="0" smtClean="0">
+              <a:rPr lang="en-US" dirty="0">
                 <a:latin typeface="Snap ITC" panose="04040A07060A02020202" pitchFamily="82" charset="0"/>
               </a:rPr>
               <a:t>MUSIC TELEVISION  MTV</a:t>
             </a:r>
-            <a:endParaRPr lang="en-US" dirty="0">
-              <a:latin typeface="Snap ITC" panose="04040A07060A02020202" pitchFamily="82" charset="0"/>
-            </a:endParaRPr>
           </a:p>
         </p:txBody>
       </p:sp>
@@ -5849,7 +5812,7 @@
               <a:buChar char="•"/>
             </a:pPr>
             <a:r>
-              <a:rPr lang="en-US" sz="2000" b="1" dirty="0" smtClean="0"/>
+              <a:rPr lang="en-US" sz="2000" b="1" dirty="0"/>
               <a:t>Founded on 1 August 1981.</a:t>
             </a:r>
           </a:p>
@@ -5862,15 +5825,9 @@
               <a:rPr lang="en-US" sz="2000" b="1" dirty="0">
                 <a:hlinkClick r:id="rId3"/>
               </a:rPr>
-              <a:t>https://</a:t>
-            </a:r>
-            <a:r>
-              <a:rPr lang="en-US" sz="2000" b="1" dirty="0" smtClean="0">
-                <a:hlinkClick r:id="rId3"/>
-              </a:rPr>
-              <a:t>www.youtube.com/watch?v=XBf0yJVMSzI</a:t>
-            </a:r>
-            <a:endParaRPr lang="en-US" sz="2000" b="1" dirty="0" smtClean="0"/>
+              <a:t>https://www.youtube.com/watch?v=XBf0yJVMSzI</a:t>
+            </a:r>
+            <a:endParaRPr lang="en-US" sz="2000" b="1" dirty="0"/>
           </a:p>
           <a:p>
             <a:pPr marL="285750" indent="-285750">
@@ -5878,7 +5835,7 @@
               <a:buChar char="•"/>
             </a:pPr>
             <a:r>
-              <a:rPr lang="en-US" sz="2000" b="1" dirty="0" smtClean="0"/>
+              <a:rPr lang="en-US" sz="2000" b="1" dirty="0"/>
               <a:t>To play music videos, introduced by video jockeys.</a:t>
             </a:r>
           </a:p>
@@ -5888,34 +5845,24 @@
               <a:buChar char="•"/>
             </a:pPr>
             <a:r>
-              <a:rPr lang="en-US" sz="2000" b="1" dirty="0" smtClean="0"/>
+              <a:rPr lang="en-US" sz="2000" b="1" dirty="0"/>
               <a:t>The </a:t>
             </a:r>
             <a:r>
-              <a:rPr lang="en-US" sz="2000" b="1" dirty="0" err="1" smtClean="0"/>
+              <a:rPr lang="en-US" sz="2000" b="1" dirty="0" err="1"/>
               <a:t>Buggles</a:t>
             </a:r>
             <a:r>
-              <a:rPr lang="en-US" sz="2000" b="1" dirty="0" smtClean="0"/>
-              <a:t>, “Video killed the </a:t>
-            </a:r>
-            <a:r>
               <a:rPr lang="en-US" sz="2000" b="1" dirty="0"/>
-              <a:t>radio star”: </a:t>
-            </a:r>
-            <a:r>
-              <a:rPr lang="en-US" sz="2000" b="1" dirty="0">
+              <a:t>, “Video killed the radio star”: </a:t>
+            </a:r>
+            <a:r>
+              <a:rPr lang="en-CA" sz="2000" dirty="0">
                 <a:hlinkClick r:id="rId4"/>
               </a:rPr>
-              <a:t>https://</a:t>
-            </a:r>
-            <a:r>
-              <a:rPr lang="en-US" sz="2000" b="1" dirty="0" smtClean="0">
-                <a:hlinkClick r:id="rId4"/>
-              </a:rPr>
-              <a:t>www.youtube.com/watch?v=W8r-tXRLazs</a:t>
-            </a:r>
-            <a:endParaRPr lang="en-US" sz="2000" b="1" dirty="0" smtClean="0"/>
+              <a:t>https://www.youtube.com/watch?v=Iwuy4hHO3YQ</a:t>
+            </a:r>
+            <a:endParaRPr lang="en-CA" sz="2000" dirty="0"/>
           </a:p>
           <a:p>
             <a:pPr marL="285750" indent="-285750">
@@ -5923,7 +5870,7 @@
               <a:buChar char="•"/>
             </a:pPr>
             <a:r>
-              <a:rPr lang="en-US" sz="2000" b="1" dirty="0" smtClean="0"/>
+              <a:rPr lang="en-US" sz="2000" b="1" dirty="0"/>
               <a:t>Disrupted radio’s dominance; changed record selection (e.g. Men at Work).</a:t>
             </a:r>
           </a:p>
@@ -5933,7 +5880,7 @@
               <a:buChar char="•"/>
             </a:pPr>
             <a:r>
-              <a:rPr lang="en-US" sz="2000" b="1" dirty="0" smtClean="0"/>
+              <a:rPr lang="en-US" sz="2000" b="1" dirty="0"/>
               <a:t>Now mostly reality, drama, and comedy shows with a few music videos</a:t>
             </a:r>
           </a:p>
@@ -5943,7 +5890,7 @@
               <a:buChar char="•"/>
             </a:pPr>
             <a:r>
-              <a:rPr lang="en-US" sz="2000" b="1" dirty="0" smtClean="0"/>
+              <a:rPr lang="en-US" sz="2000" b="1" dirty="0"/>
               <a:t>By 2015, 80% of USA households subscribe to MTV.</a:t>
             </a:r>
           </a:p>
@@ -5959,13 +5906,6 @@
   <p:clrMapOvr>
     <a:masterClrMapping/>
   </p:clrMapOvr>
-  <p:timing>
-    <p:tnLst>
-      <p:par>
-        <p:cTn id="1" dur="indefinite" restart="never" nodeType="tmRoot"/>
-      </p:par>
-    </p:tnLst>
-  </p:timing>
 </p:sld>
 </file>
 
@@ -6007,14 +5947,11 @@
           <a:lstStyle/>
           <a:p>
             <a:r>
-              <a:rPr lang="en-US" dirty="0" smtClean="0">
+              <a:rPr lang="en-US" dirty="0">
                 <a:latin typeface="Broadway" panose="04040905080B02020502" pitchFamily="82" charset="0"/>
               </a:rPr>
               <a:t>Michael Jackson, 1958-2009</a:t>
             </a:r>
-            <a:endParaRPr lang="en-US" dirty="0">
-              <a:latin typeface="Broadway" panose="04040905080B02020502" pitchFamily="82" charset="0"/>
-            </a:endParaRPr>
           </a:p>
         </p:txBody>
       </p:sp>
@@ -6074,19 +6011,19 @@
               <a:buChar char="•"/>
             </a:pPr>
             <a:r>
-              <a:rPr lang="en-US" sz="2800" dirty="0" smtClean="0">
+              <a:rPr lang="en-US" sz="2800" dirty="0">
                 <a:latin typeface="Broadway" panose="04040905080B02020502" pitchFamily="82" charset="0"/>
               </a:rPr>
               <a:t>Started in </a:t>
             </a:r>
             <a:r>
-              <a:rPr lang="en-US" sz="2800" b="1" i="1" dirty="0" smtClean="0">
+              <a:rPr lang="en-US" sz="2800" b="1" i="1" dirty="0">
                 <a:latin typeface="Broadway" panose="04040905080B02020502" pitchFamily="82" charset="0"/>
               </a:rPr>
               <a:t>Jackson Five </a:t>
             </a:r>
             <a:r>
-              <a:rPr lang="en-US" sz="2800" dirty="0" smtClean="0">
+              <a:rPr lang="en-US" sz="2800" dirty="0">
                 <a:latin typeface="Broadway" panose="04040905080B02020502" pitchFamily="82" charset="0"/>
               </a:rPr>
               <a:t>at age six.</a:t>
@@ -6098,7 +6035,7 @@
               <a:buChar char="•"/>
             </a:pPr>
             <a:r>
-              <a:rPr lang="en-US" sz="2800" dirty="0" smtClean="0">
+              <a:rPr lang="en-US" sz="2800" dirty="0">
                 <a:latin typeface="Broadway" panose="04040905080B02020502" pitchFamily="82" charset="0"/>
               </a:rPr>
               <a:t>1971: Started solo career</a:t>
@@ -6110,7 +6047,7 @@
               <a:buChar char="•"/>
             </a:pPr>
             <a:r>
-              <a:rPr lang="en-US" sz="2800" dirty="0" smtClean="0">
+              <a:rPr lang="en-US" sz="2800" dirty="0">
                 <a:latin typeface="Broadway" panose="04040905080B02020502" pitchFamily="82" charset="0"/>
               </a:rPr>
               <a:t>1975: The Wiz, played Scarecrow, met Quincy Jones.</a:t>
@@ -6122,19 +6059,19 @@
               <a:buChar char="•"/>
             </a:pPr>
             <a:r>
-              <a:rPr lang="en-US" sz="2800" dirty="0" smtClean="0">
+              <a:rPr lang="en-US" sz="2800" dirty="0">
                 <a:latin typeface="Broadway" panose="04040905080B02020502" pitchFamily="82" charset="0"/>
               </a:rPr>
               <a:t>1979: </a:t>
             </a:r>
             <a:r>
-              <a:rPr lang="en-US" sz="2800" i="1" dirty="0" smtClean="0">
+              <a:rPr lang="en-US" sz="2800" i="1" dirty="0">
                 <a:latin typeface="Broadway" panose="04040905080B02020502" pitchFamily="82" charset="0"/>
               </a:rPr>
               <a:t>Off the Wall</a:t>
             </a:r>
             <a:r>
-              <a:rPr lang="en-US" sz="2800" dirty="0" smtClean="0">
+              <a:rPr lang="en-US" sz="2800" dirty="0">
                 <a:latin typeface="Broadway" panose="04040905080B02020502" pitchFamily="82" charset="0"/>
               </a:rPr>
               <a:t>, first major album</a:t>
@@ -6146,7 +6083,7 @@
               <a:buChar char="•"/>
             </a:pPr>
             <a:r>
-              <a:rPr lang="en-US" sz="2800" dirty="0" smtClean="0">
+              <a:rPr lang="en-US" sz="2800" dirty="0">
                 <a:latin typeface="Broadway" panose="04040905080B02020502" pitchFamily="82" charset="0"/>
               </a:rPr>
               <a:t>“Don’t Stop till you get enough”:</a:t>
@@ -6162,16 +6099,9 @@
                 <a:latin typeface="Broadway" panose="04040905080B02020502" pitchFamily="82" charset="0"/>
                 <a:hlinkClick r:id="rId3"/>
               </a:rPr>
-              <a:t>https://</a:t>
-            </a:r>
-            <a:r>
-              <a:rPr lang="en-US" sz="2800" dirty="0" smtClean="0">
-                <a:latin typeface="Broadway" panose="04040905080B02020502" pitchFamily="82" charset="0"/>
-                <a:hlinkClick r:id="rId3"/>
-              </a:rPr>
-              <a:t>www.youtube.com/watch?v=yURRmWtbTbo</a:t>
-            </a:r>
-            <a:endParaRPr lang="en-US" sz="2800" dirty="0" smtClean="0">
+              <a:t>https://www.youtube.com/watch?v=yURRmWtbTbo</a:t>
+            </a:r>
+            <a:endParaRPr lang="en-US" sz="2800" dirty="0">
               <a:latin typeface="Broadway" panose="04040905080B02020502" pitchFamily="82" charset="0"/>
             </a:endParaRPr>
           </a:p>
@@ -6187,13 +6117,6 @@
   <p:clrMapOvr>
     <a:masterClrMapping/>
   </p:clrMapOvr>
-  <p:timing>
-    <p:tnLst>
-      <p:par>
-        <p:cTn id="1" dur="indefinite" restart="never" nodeType="tmRoot"/>
-      </p:par>
-    </p:tnLst>
-  </p:timing>
 </p:sld>
 </file>
 
@@ -6271,16 +6194,10 @@
               <a:buChar char="v"/>
             </a:pPr>
             <a:r>
-              <a:rPr lang="en-US" sz="2400" dirty="0" smtClean="0">
-                <a:latin typeface="Broadway" panose="04040905080B02020502" pitchFamily="82" charset="0"/>
-              </a:rPr>
-              <a:t>1982</a:t>
-            </a:r>
-            <a:r>
               <a:rPr lang="en-US" sz="2400" dirty="0">
                 <a:latin typeface="Broadway" panose="04040905080B02020502" pitchFamily="82" charset="0"/>
               </a:rPr>
-              <a:t>: </a:t>
+              <a:t>1982: </a:t>
             </a:r>
             <a:r>
               <a:rPr lang="en-US" sz="2400" i="1" dirty="0">
@@ -6317,46 +6234,22 @@
               <a:buChar char="v"/>
             </a:pPr>
             <a:r>
-              <a:rPr lang="en-US" sz="2400" dirty="0" smtClean="0">
-                <a:latin typeface="Broadway" panose="04040905080B02020502" pitchFamily="82" charset="0"/>
-              </a:rPr>
-              <a:t>Seven singles, </a:t>
-            </a:r>
-            <a:r>
               <a:rPr lang="en-US" sz="2400" dirty="0">
                 <a:latin typeface="Broadway" panose="04040905080B02020502" pitchFamily="82" charset="0"/>
               </a:rPr>
-              <a:t>all of </a:t>
-            </a:r>
-            <a:r>
-              <a:rPr lang="en-US" sz="2400" dirty="0" smtClean="0">
+              <a:t>Seven singles, all of them reached the top 10 on the </a:t>
+            </a:r>
+            <a:r>
+              <a:rPr lang="en-US" sz="2400" i="1" dirty="0">
                 <a:latin typeface="Broadway" panose="04040905080B02020502" pitchFamily="82" charset="0"/>
               </a:rPr>
-              <a:t>them reached </a:t>
+              <a:t>Billboard</a:t>
             </a:r>
             <a:r>
               <a:rPr lang="en-US" sz="2400" dirty="0">
                 <a:latin typeface="Broadway" panose="04040905080B02020502" pitchFamily="82" charset="0"/>
               </a:rPr>
-              <a:t>the top 10 on the </a:t>
-            </a:r>
-            <a:r>
-              <a:rPr lang="en-US" sz="2400" i="1" dirty="0">
-                <a:latin typeface="Broadway" panose="04040905080B02020502" pitchFamily="82" charset="0"/>
-              </a:rPr>
-              <a:t>Billboard</a:t>
-            </a:r>
-            <a:r>
-              <a:rPr lang="en-US" sz="2400" dirty="0">
-                <a:latin typeface="Broadway" panose="04040905080B02020502" pitchFamily="82" charset="0"/>
-              </a:rPr>
-              <a:t> Hot 100</a:t>
-            </a:r>
-            <a:r>
-              <a:rPr lang="en-US" sz="2400" dirty="0" smtClean="0">
-                <a:latin typeface="Broadway" panose="04040905080B02020502" pitchFamily="82" charset="0"/>
-              </a:rPr>
-              <a:t>.</a:t>
+              <a:t> Hot 100.</a:t>
             </a:r>
           </a:p>
           <a:p>
@@ -6365,7 +6258,7 @@
               <a:buChar char="v"/>
             </a:pPr>
             <a:r>
-              <a:rPr lang="en-US" sz="2400" dirty="0" smtClean="0">
+              <a:rPr lang="en-US" sz="2400" dirty="0">
                 <a:latin typeface="Broadway" panose="04040905080B02020502" pitchFamily="82" charset="0"/>
               </a:rPr>
               <a:t>Three videos: “Billie Jean”, “Thriller,” “Beat it!”</a:t>
@@ -6377,35 +6270,18 @@
               <a:buChar char="v"/>
             </a:pPr>
             <a:r>
-              <a:rPr lang="en-US" sz="2400" dirty="0" smtClean="0">
-                <a:latin typeface="Broadway" panose="04040905080B02020502" pitchFamily="82" charset="0"/>
-              </a:rPr>
-              <a:t>“Beat it”: </a:t>
-            </a:r>
-            <a:r>
-              <a:rPr lang="en-US" sz="2400" dirty="0" smtClean="0">
-                <a:latin typeface="Broadway" panose="04040905080B02020502" pitchFamily="82" charset="0"/>
-                <a:hlinkClick r:id="rId3"/>
-              </a:rPr>
-              <a:t>https</a:t>
-            </a:r>
-            <a:r>
               <a:rPr lang="en-US" sz="2400" dirty="0">
                 <a:latin typeface="Broadway" panose="04040905080B02020502" pitchFamily="82" charset="0"/>
+              </a:rPr>
+              <a:t>“Beat it”: </a:t>
+            </a:r>
+            <a:r>
+              <a:rPr lang="en-CA" sz="2400" dirty="0">
                 <a:hlinkClick r:id="rId3"/>
               </a:rPr>
-              <a:t>://</a:t>
-            </a:r>
-            <a:r>
-              <a:rPr lang="en-US" sz="2400" dirty="0" smtClean="0">
-                <a:latin typeface="Broadway" panose="04040905080B02020502" pitchFamily="82" charset="0"/>
-                <a:hlinkClick r:id="rId3"/>
-              </a:rPr>
-              <a:t>www.youtube.com/watch?v=Ym0hZG-zNOk</a:t>
-            </a:r>
-            <a:endParaRPr lang="en-US" sz="2400" dirty="0" smtClean="0">
-              <a:latin typeface="Broadway" panose="04040905080B02020502" pitchFamily="82" charset="0"/>
-            </a:endParaRPr>
+              <a:t>https://www.youtube.com/watch?v=oRdxUFDoQe0</a:t>
+            </a:r>
+            <a:endParaRPr lang="en-CA" sz="2400" dirty="0"/>
           </a:p>
           <a:p>
             <a:pPr>
@@ -6413,7 +6289,7 @@
               <a:buChar char="v"/>
             </a:pPr>
             <a:r>
-              <a:rPr lang="en-US" sz="2400" dirty="0" smtClean="0">
+              <a:rPr lang="en-US" sz="2400" dirty="0">
                 <a:latin typeface="Broadway" panose="04040905080B02020502" pitchFamily="82" charset="0"/>
               </a:rPr>
               <a:t>Ended gang violence?</a:t>
@@ -6425,13 +6301,13 @@
               <a:buChar char="v"/>
             </a:pPr>
             <a:r>
-              <a:rPr lang="en-US" sz="2400" i="1" dirty="0" smtClean="0">
+              <a:rPr lang="en-US" sz="2400" i="1" dirty="0">
                 <a:latin typeface="Broadway" panose="04040905080B02020502" pitchFamily="82" charset="0"/>
               </a:rPr>
               <a:t>Thriller</a:t>
             </a:r>
             <a:r>
-              <a:rPr lang="en-US" sz="2400" dirty="0" smtClean="0">
+              <a:rPr lang="en-US" sz="2400" dirty="0">
                 <a:latin typeface="Broadway" panose="04040905080B02020502" pitchFamily="82" charset="0"/>
               </a:rPr>
               <a:t> was best-selling album of 1983, became best-selling album of all time all world, about 65 million altogether.</a:t>
@@ -6443,7 +6319,7 @@
               <a:buChar char="v"/>
             </a:pPr>
             <a:r>
-              <a:rPr lang="en-US" sz="2400" dirty="0" smtClean="0">
+              <a:rPr lang="en-US" sz="2400" dirty="0">
                 <a:latin typeface="Broadway" panose="04040905080B02020502" pitchFamily="82" charset="0"/>
               </a:rPr>
               <a:t>Lots of controversies…</a:t>
@@ -6455,7 +6331,7 @@
               <a:buChar char="v"/>
             </a:pPr>
             <a:r>
-              <a:rPr lang="en-US" sz="2400" dirty="0" smtClean="0">
+              <a:rPr lang="en-US" sz="2400" dirty="0">
                 <a:latin typeface="Broadway" panose="04040905080B02020502" pitchFamily="82" charset="0"/>
               </a:rPr>
               <a:t>Death ruled a homicide by his personal doctor.</a:t>
@@ -6473,13 +6349,6 @@
   <p:clrMapOvr>
     <a:masterClrMapping/>
   </p:clrMapOvr>
-  <p:timing>
-    <p:tnLst>
-      <p:par>
-        <p:cTn id="1" dur="indefinite" restart="never" nodeType="tmRoot"/>
-      </p:par>
-    </p:tnLst>
-  </p:timing>
 </p:sld>
 </file>
 
@@ -6523,10 +6392,9 @@
           <a:lstStyle/>
           <a:p>
             <a:r>
-              <a:rPr lang="en-US" sz="9600" dirty="0" smtClean="0"/>
+              <a:rPr lang="en-US" sz="9600" dirty="0"/>
               <a:t>U2</a:t>
             </a:r>
-            <a:endParaRPr lang="en-US" sz="9600" dirty="0"/>
           </a:p>
         </p:txBody>
       </p:sp>
@@ -6557,7 +6425,7 @@
               <a:buChar char="v"/>
             </a:pPr>
             <a:r>
-              <a:rPr lang="en-US" sz="2400" dirty="0" smtClean="0">
+              <a:rPr lang="en-US" sz="2400" dirty="0">
                 <a:latin typeface="Arial Rounded MT Bold" panose="020F0704030504030204" pitchFamily="34" charset="0"/>
               </a:rPr>
               <a:t>Formed in 1976 in Dublin:</a:t>
@@ -6569,34 +6437,10 @@
               <a:buChar char="v"/>
             </a:pPr>
             <a:r>
-              <a:rPr lang="en-US" sz="2400" dirty="0" smtClean="0">
-                <a:latin typeface="Arial Rounded MT Bold" panose="020F0704030504030204" pitchFamily="34" charset="0"/>
-              </a:rPr>
-              <a:t>Paul </a:t>
-            </a:r>
-            <a:r>
               <a:rPr lang="en-US" sz="2400" dirty="0">
                 <a:latin typeface="Arial Rounded MT Bold" panose="020F0704030504030204" pitchFamily="34" charset="0"/>
               </a:rPr>
-              <a:t>David </a:t>
-            </a:r>
-            <a:r>
-              <a:rPr lang="en-US" sz="2400" dirty="0" smtClean="0">
-                <a:latin typeface="Arial Rounded MT Bold" panose="020F0704030504030204" pitchFamily="34" charset="0"/>
-              </a:rPr>
-              <a:t>Hewson / Bono</a:t>
-            </a:r>
-            <a:r>
-              <a:rPr lang="en-US" sz="2400" dirty="0">
-                <a:latin typeface="Arial Rounded MT Bold" panose="020F0704030504030204" pitchFamily="34" charset="0"/>
-              </a:rPr>
-              <a:t> (vocals and rhythm </a:t>
-            </a:r>
-            <a:r>
-              <a:rPr lang="en-US" sz="2400" dirty="0" smtClean="0">
-                <a:latin typeface="Arial Rounded MT Bold" panose="020F0704030504030204" pitchFamily="34" charset="0"/>
-              </a:rPr>
-              <a:t>guitar)</a:t>
+              <a:t>Paul David Hewson / Bono (vocals and rhythm guitar)</a:t>
             </a:r>
           </a:p>
           <a:p>
@@ -6608,25 +6452,7 @@
               <a:rPr lang="en-US" sz="2400" dirty="0">
                 <a:latin typeface="Arial Rounded MT Bold" panose="020F0704030504030204" pitchFamily="34" charset="0"/>
               </a:rPr>
-              <a:t>David Howell </a:t>
-            </a:r>
-            <a:r>
-              <a:rPr lang="en-US" sz="2400" dirty="0" smtClean="0">
-                <a:latin typeface="Arial Rounded MT Bold" panose="020F0704030504030204" pitchFamily="34" charset="0"/>
-              </a:rPr>
-              <a:t>Evans / the </a:t>
-            </a:r>
-            <a:r>
-              <a:rPr lang="en-US" sz="2400" dirty="0">
-                <a:latin typeface="Arial Rounded MT Bold" panose="020F0704030504030204" pitchFamily="34" charset="0"/>
-              </a:rPr>
-              <a:t>Edge (lead guitar, keyboards, and </a:t>
-            </a:r>
-            <a:r>
-              <a:rPr lang="en-US" sz="2400" dirty="0" smtClean="0">
-                <a:latin typeface="Arial Rounded MT Bold" panose="020F0704030504030204" pitchFamily="34" charset="0"/>
-              </a:rPr>
-              <a:t>vocals)</a:t>
+              <a:t>David Howell Evans / the Edge (lead guitar, keyboards, and vocals)</a:t>
             </a:r>
           </a:p>
           <a:p>
@@ -6635,22 +6461,10 @@
               <a:buChar char="v"/>
             </a:pPr>
             <a:r>
-              <a:rPr lang="en-US" sz="2400" dirty="0" smtClean="0">
-                <a:latin typeface="Arial Rounded MT Bold" panose="020F0704030504030204" pitchFamily="34" charset="0"/>
-              </a:rPr>
-              <a:t>Adam </a:t>
-            </a:r>
-            <a:r>
               <a:rPr lang="en-US" sz="2400" dirty="0">
                 <a:latin typeface="Arial Rounded MT Bold" panose="020F0704030504030204" pitchFamily="34" charset="0"/>
               </a:rPr>
-              <a:t>Clayton (bass </a:t>
-            </a:r>
-            <a:r>
-              <a:rPr lang="en-US" sz="2400" dirty="0" smtClean="0">
-                <a:latin typeface="Arial Rounded MT Bold" panose="020F0704030504030204" pitchFamily="34" charset="0"/>
-              </a:rPr>
-              <a:t>guitar)</a:t>
+              <a:t>Adam Clayton (bass guitar)</a:t>
             </a:r>
           </a:p>
           <a:p>
@@ -6659,22 +6473,10 @@
               <a:buChar char="v"/>
             </a:pPr>
             <a:r>
-              <a:rPr lang="en-US" sz="2400" dirty="0" smtClean="0">
-                <a:latin typeface="Arial Rounded MT Bold" panose="020F0704030504030204" pitchFamily="34" charset="0"/>
-              </a:rPr>
-              <a:t>Larry </a:t>
-            </a:r>
-            <a:r>
               <a:rPr lang="en-US" sz="2400" dirty="0">
                 <a:latin typeface="Arial Rounded MT Bold" panose="020F0704030504030204" pitchFamily="34" charset="0"/>
               </a:rPr>
-              <a:t>Mullen, Jr. (drums and percussion</a:t>
-            </a:r>
-            <a:r>
-              <a:rPr lang="en-US" sz="2400" dirty="0" smtClean="0">
-                <a:latin typeface="Arial Rounded MT Bold" panose="020F0704030504030204" pitchFamily="34" charset="0"/>
-              </a:rPr>
-              <a:t>)</a:t>
+              <a:t>Larry Mullen, Jr. (drums and percussion)</a:t>
             </a:r>
           </a:p>
           <a:p>
@@ -6683,7 +6485,7 @@
               <a:buChar char="v"/>
             </a:pPr>
             <a:r>
-              <a:rPr lang="en-US" sz="2400" dirty="0" smtClean="0">
+              <a:rPr lang="en-US" sz="2400" dirty="0">
                 <a:latin typeface="Arial Rounded MT Bold" panose="020F0704030504030204" pitchFamily="34" charset="0"/>
               </a:rPr>
               <a:t>Name was chosen from a friend’s list, least hated, ambiguous.</a:t>
@@ -6695,13 +6497,13 @@
               <a:buChar char="v"/>
             </a:pPr>
             <a:r>
-              <a:rPr lang="en-US" sz="2400" i="1" dirty="0" smtClean="0">
+              <a:rPr lang="en-US" sz="2400" i="1" dirty="0">
                 <a:latin typeface="Arial Rounded MT Bold" panose="020F0704030504030204" pitchFamily="34" charset="0"/>
               </a:rPr>
               <a:t>Boy</a:t>
             </a:r>
             <a:r>
-              <a:rPr lang="en-US" sz="2400" dirty="0" smtClean="0">
+              <a:rPr lang="en-US" sz="2400" dirty="0">
                 <a:latin typeface="Arial Rounded MT Bold" panose="020F0704030504030204" pitchFamily="34" charset="0"/>
               </a:rPr>
               <a:t>, 1980</a:t>
@@ -6713,32 +6515,19 @@
               <a:buChar char="v"/>
             </a:pPr>
             <a:r>
-              <a:rPr lang="en-US" sz="2400" dirty="0" smtClean="0">
-                <a:latin typeface="Arial Rounded MT Bold" panose="020F0704030504030204" pitchFamily="34" charset="0"/>
-              </a:rPr>
-              <a:t>“I </a:t>
-            </a:r>
-            <a:r>
               <a:rPr lang="en-US" sz="2400" dirty="0">
                 <a:latin typeface="Arial Rounded MT Bold" panose="020F0704030504030204" pitchFamily="34" charset="0"/>
               </a:rPr>
-              <a:t>will follow”: </a:t>
+              <a:t>“I will follow”: </a:t>
             </a:r>
             <a:r>
               <a:rPr lang="en-US" sz="2400" dirty="0">
                 <a:latin typeface="Arial Rounded MT Bold" panose="020F0704030504030204" pitchFamily="34" charset="0"/>
                 <a:hlinkClick r:id="rId2"/>
               </a:rPr>
-              <a:t>https://</a:t>
-            </a:r>
-            <a:r>
-              <a:rPr lang="en-US" sz="2400" dirty="0" smtClean="0">
-                <a:latin typeface="Arial Rounded MT Bold" panose="020F0704030504030204" pitchFamily="34" charset="0"/>
-                <a:hlinkClick r:id="rId2"/>
-              </a:rPr>
-              <a:t>www.youtube.com/watch?v=g2BqLlVHlWA</a:t>
-            </a:r>
-            <a:endParaRPr lang="en-US" sz="2400" dirty="0" smtClean="0">
+              <a:t>https://www.youtube.com/watch?v=g2BqLlVHlWA</a:t>
+            </a:r>
+            <a:endParaRPr lang="en-US" sz="2400" dirty="0">
               <a:latin typeface="Arial Rounded MT Bold" panose="020F0704030504030204" pitchFamily="34" charset="0"/>
             </a:endParaRPr>
           </a:p>
@@ -6748,13 +6537,13 @@
               <a:buChar char="v"/>
             </a:pPr>
             <a:r>
-              <a:rPr lang="en-US" sz="2400" i="1" dirty="0" smtClean="0">
+              <a:rPr lang="en-US" sz="2400" i="1" dirty="0">
                 <a:latin typeface="Arial Rounded MT Bold" panose="020F0704030504030204" pitchFamily="34" charset="0"/>
               </a:rPr>
               <a:t>October</a:t>
             </a:r>
             <a:r>
-              <a:rPr lang="en-US" sz="2400" dirty="0" smtClean="0">
+              <a:rPr lang="en-US" sz="2400" dirty="0">
                 <a:latin typeface="Arial Rounded MT Bold" panose="020F0704030504030204" pitchFamily="34" charset="0"/>
               </a:rPr>
               <a:t>, 1981</a:t>
@@ -6772,13 +6561,6 @@
   <p:clrMapOvr>
     <a:masterClrMapping/>
   </p:clrMapOvr>
-  <p:timing>
-    <p:tnLst>
-      <p:par>
-        <p:cTn id="1" dur="indefinite" restart="never" nodeType="tmRoot"/>
-      </p:par>
-    </p:tnLst>
-  </p:timing>
 </p:sld>
 </file>
 
@@ -6822,10 +6604,9 @@
           <a:lstStyle/>
           <a:p>
             <a:r>
-              <a:rPr lang="en-US" sz="9600" dirty="0" smtClean="0"/>
+              <a:rPr lang="en-US" sz="9600" dirty="0"/>
               <a:t>U2</a:t>
             </a:r>
-            <a:endParaRPr lang="en-US" sz="9600" dirty="0"/>
           </a:p>
         </p:txBody>
       </p:sp>
@@ -6856,13 +6637,13 @@
               <a:buChar char="v"/>
             </a:pPr>
             <a:r>
-              <a:rPr lang="en-US" sz="3500" i="1" dirty="0" smtClean="0">
+              <a:rPr lang="en-US" sz="3500" i="1" dirty="0">
                 <a:latin typeface="Arial Rounded MT Bold" panose="020F0704030504030204" pitchFamily="34" charset="0"/>
               </a:rPr>
               <a:t>War</a:t>
             </a:r>
             <a:r>
-              <a:rPr lang="en-US" sz="3500" dirty="0" smtClean="0">
+              <a:rPr lang="en-US" sz="3500" dirty="0">
                 <a:latin typeface="Arial Rounded MT Bold" panose="020F0704030504030204" pitchFamily="34" charset="0"/>
               </a:rPr>
               <a:t>, 1983</a:t>
@@ -6874,31 +6655,19 @@
               <a:buChar char="v"/>
             </a:pPr>
             <a:r>
-              <a:rPr lang="en-US" sz="2400" dirty="0" smtClean="0">
-                <a:latin typeface="Arial Rounded MT Bold" panose="020F0704030504030204" pitchFamily="34" charset="0"/>
-              </a:rPr>
-              <a:t>Explicitly political</a:t>
-            </a:r>
-            <a:r>
               <a:rPr lang="en-US" sz="2400" dirty="0">
                 <a:latin typeface="Arial Rounded MT Bold" panose="020F0704030504030204" pitchFamily="34" charset="0"/>
               </a:rPr>
-              <a:t> </a:t>
-            </a:r>
-            <a:r>
-              <a:rPr lang="en-US" sz="2400" dirty="0" smtClean="0">
+              <a:t>Explicitly political and harsh sound, clashed with </a:t>
+            </a:r>
+            <a:r>
+              <a:rPr lang="en-US" sz="2400" dirty="0" err="1">
                 <a:latin typeface="Arial Rounded MT Bold" panose="020F0704030504030204" pitchFamily="34" charset="0"/>
               </a:rPr>
-              <a:t>and harsh sound, clashed with </a:t>
-            </a:r>
-            <a:r>
-              <a:rPr lang="en-US" sz="2400" dirty="0" err="1" smtClean="0">
-                <a:latin typeface="Arial Rounded MT Bold" panose="020F0704030504030204" pitchFamily="34" charset="0"/>
-              </a:rPr>
               <a:t>synthpop</a:t>
             </a:r>
             <a:r>
-              <a:rPr lang="en-US" sz="2400" dirty="0" smtClean="0">
+              <a:rPr lang="en-US" sz="2400" dirty="0">
                 <a:latin typeface="Arial Rounded MT Bold" panose="020F0704030504030204" pitchFamily="34" charset="0"/>
               </a:rPr>
               <a:t> and dance music.</a:t>
@@ -6910,22 +6679,10 @@
               <a:buChar char="v"/>
             </a:pPr>
             <a:r>
-              <a:rPr lang="en-US" sz="2400" dirty="0" smtClean="0">
-                <a:latin typeface="Arial Rounded MT Bold" panose="020F0704030504030204" pitchFamily="34" charset="0"/>
-              </a:rPr>
-              <a:t>“Sunday </a:t>
-            </a:r>
-            <a:r>
               <a:rPr lang="en-US" sz="2400" dirty="0">
                 <a:latin typeface="Arial Rounded MT Bold" panose="020F0704030504030204" pitchFamily="34" charset="0"/>
               </a:rPr>
-              <a:t>Bloody </a:t>
-            </a:r>
-            <a:r>
-              <a:rPr lang="en-US" sz="2400" dirty="0" smtClean="0">
-                <a:latin typeface="Arial Rounded MT Bold" panose="020F0704030504030204" pitchFamily="34" charset="0"/>
-              </a:rPr>
-              <a:t>Sunday”</a:t>
+              <a:t>“Sunday Bloody Sunday”</a:t>
             </a:r>
           </a:p>
           <a:p>
@@ -6938,16 +6695,9 @@
                 <a:latin typeface="Arial Rounded MT Bold" panose="020F0704030504030204" pitchFamily="34" charset="0"/>
                 <a:hlinkClick r:id="rId2"/>
               </a:rPr>
-              <a:t>https://</a:t>
-            </a:r>
-            <a:r>
-              <a:rPr lang="en-US" sz="2400" dirty="0" smtClean="0">
-                <a:latin typeface="Arial Rounded MT Bold" panose="020F0704030504030204" pitchFamily="34" charset="0"/>
-                <a:hlinkClick r:id="rId2"/>
-              </a:rPr>
-              <a:t>www.youtube.com/watch?v=lVj7J-78Gu8</a:t>
-            </a:r>
-            <a:endParaRPr lang="en-US" sz="2400" dirty="0" smtClean="0">
+              <a:t>https://www.youtube.com/watch?v=lVj7J-78Gu8</a:t>
+            </a:r>
+            <a:endParaRPr lang="en-US" sz="2400" dirty="0">
               <a:latin typeface="Arial Rounded MT Bold" panose="020F0704030504030204" pitchFamily="34" charset="0"/>
             </a:endParaRPr>
           </a:p>
@@ -6957,7 +6707,7 @@
               <a:buChar char="v"/>
             </a:pPr>
             <a:r>
-              <a:rPr lang="en-US" sz="2400" dirty="0" smtClean="0">
+              <a:rPr lang="en-US" sz="2400" dirty="0">
                 <a:latin typeface="Arial Rounded MT Bold" panose="020F0704030504030204" pitchFamily="34" charset="0"/>
               </a:rPr>
               <a:t>“New Year’s Day”</a:t>
@@ -6969,7 +6719,7 @@
               <a:buChar char="v"/>
             </a:pPr>
             <a:r>
-              <a:rPr lang="en-US" sz="2400" dirty="0" smtClean="0">
+              <a:rPr lang="en-US" sz="2400" dirty="0">
                 <a:latin typeface="Arial Rounded MT Bold" panose="020F0704030504030204" pitchFamily="34" charset="0"/>
               </a:rPr>
               <a:t>“Two Hearts Beat as one”</a:t>
@@ -6981,7 +6731,7 @@
               <a:buChar char="v"/>
             </a:pPr>
             <a:r>
-              <a:rPr lang="en-US" sz="3500" dirty="0" smtClean="0">
+              <a:rPr lang="en-US" sz="3500" dirty="0">
                 <a:latin typeface="Arial Rounded MT Bold" panose="020F0704030504030204" pitchFamily="34" charset="0"/>
               </a:rPr>
               <a:t>Unforgettable Fire, 1984</a:t>
@@ -6993,31 +6743,31 @@
               <a:buChar char="v"/>
             </a:pPr>
             <a:r>
-              <a:rPr lang="en-US" sz="2400" dirty="0" smtClean="0">
+              <a:rPr lang="en-US" sz="2400" dirty="0">
                 <a:latin typeface="Arial Rounded MT Bold" panose="020F0704030504030204" pitchFamily="34" charset="0"/>
               </a:rPr>
               <a:t>Brian </a:t>
             </a:r>
             <a:r>
-              <a:rPr lang="en-US" sz="2400" dirty="0" err="1" smtClean="0">
+              <a:rPr lang="en-US" sz="2400" dirty="0" err="1">
                 <a:latin typeface="Arial Rounded MT Bold" panose="020F0704030504030204" pitchFamily="34" charset="0"/>
               </a:rPr>
               <a:t>Eno</a:t>
             </a:r>
             <a:r>
-              <a:rPr lang="en-US" sz="2400" dirty="0" smtClean="0">
+              <a:rPr lang="en-US" sz="2400" dirty="0">
                 <a:latin typeface="Arial Rounded MT Bold" panose="020F0704030504030204" pitchFamily="34" charset="0"/>
               </a:rPr>
               <a:t> (Roxy Music) and Daniel </a:t>
             </a:r>
             <a:r>
-              <a:rPr lang="en-US" sz="2400" dirty="0" err="1" smtClean="0">
+              <a:rPr lang="en-US" sz="2400" dirty="0" err="1">
                 <a:latin typeface="Arial Rounded MT Bold" panose="020F0704030504030204" pitchFamily="34" charset="0"/>
               </a:rPr>
               <a:t>Lanois</a:t>
             </a:r>
             <a:r>
-              <a:rPr lang="en-US" sz="2400" dirty="0" smtClean="0">
+              <a:rPr lang="en-US" sz="2400" dirty="0">
                 <a:latin typeface="Arial Rounded MT Bold" panose="020F0704030504030204" pitchFamily="34" charset="0"/>
               </a:rPr>
               <a:t> produced.</a:t>
@@ -7029,7 +6779,7 @@
               <a:buChar char="v"/>
             </a:pPr>
             <a:r>
-              <a:rPr lang="en-US" sz="2400" dirty="0" smtClean="0">
+              <a:rPr lang="en-US" sz="2400" dirty="0">
                 <a:latin typeface="Arial Rounded MT Bold" panose="020F0704030504030204" pitchFamily="34" charset="0"/>
               </a:rPr>
               <a:t>Mystical, ethereal, ambivalent lyrics, except biggest hit:</a:t>
@@ -7041,7 +6791,7 @@
               <a:buChar char="v"/>
             </a:pPr>
             <a:r>
-              <a:rPr lang="en-US" sz="2400" dirty="0" smtClean="0">
+              <a:rPr lang="en-US" sz="2400" dirty="0">
                 <a:latin typeface="Arial Rounded MT Bold" panose="020F0704030504030204" pitchFamily="34" charset="0"/>
               </a:rPr>
               <a:t>Biggest hit: “Pride (In the name of love)”</a:t>
@@ -7057,16 +6807,9 @@
                 <a:latin typeface="Arial Rounded MT Bold" panose="020F0704030504030204" pitchFamily="34" charset="0"/>
                 <a:hlinkClick r:id="rId3"/>
               </a:rPr>
-              <a:t>https://</a:t>
-            </a:r>
-            <a:r>
-              <a:rPr lang="en-US" sz="2400" dirty="0" smtClean="0">
-                <a:latin typeface="Arial Rounded MT Bold" panose="020F0704030504030204" pitchFamily="34" charset="0"/>
-                <a:hlinkClick r:id="rId3"/>
-              </a:rPr>
-              <a:t>www.youtube.com/watch?v=LHcP4MWABGY</a:t>
-            </a:r>
-            <a:endParaRPr lang="en-US" sz="2400" dirty="0" smtClean="0">
+              <a:t>https://www.youtube.com/watch?v=LHcP4MWABGY</a:t>
+            </a:r>
+            <a:endParaRPr lang="en-US" sz="2400" dirty="0">
               <a:latin typeface="Arial Rounded MT Bold" panose="020F0704030504030204" pitchFamily="34" charset="0"/>
             </a:endParaRPr>
           </a:p>
@@ -7075,7 +6818,7 @@
               <a:buFont typeface="Wingdings" panose="05000000000000000000" pitchFamily="2" charset="2"/>
               <a:buChar char="v"/>
             </a:pPr>
-            <a:endParaRPr lang="en-US" sz="2400" dirty="0" smtClean="0">
+            <a:endParaRPr lang="en-US" sz="2400" dirty="0">
               <a:latin typeface="Arial Rounded MT Bold" panose="020F0704030504030204" pitchFamily="34" charset="0"/>
             </a:endParaRPr>
           </a:p>
@@ -7091,13 +6834,6 @@
   <p:clrMapOvr>
     <a:masterClrMapping/>
   </p:clrMapOvr>
-  <p:timing>
-    <p:tnLst>
-      <p:par>
-        <p:cTn id="1" dur="indefinite" restart="never" nodeType="tmRoot"/>
-      </p:par>
-    </p:tnLst>
-  </p:timing>
 </p:sld>
 </file>
 
@@ -7139,20 +6875,17 @@
           <a:lstStyle/>
           <a:p>
             <a:r>
-              <a:rPr lang="en-US" dirty="0" smtClean="0">
+              <a:rPr lang="en-US" dirty="0">
                 <a:latin typeface="Arial Black" panose="020B0A04020102020204" pitchFamily="34" charset="0"/>
               </a:rPr>
               <a:t>Dire Straits, </a:t>
             </a:r>
             <a:r>
-              <a:rPr lang="en-US" sz="3200" dirty="0" smtClean="0">
+              <a:rPr lang="en-US" sz="3200" dirty="0">
                 <a:latin typeface="Arial Black" panose="020B0A04020102020204" pitchFamily="34" charset="0"/>
               </a:rPr>
               <a:t>1977-1988, 1991-1995</a:t>
             </a:r>
-            <a:endParaRPr lang="en-US" sz="3200" dirty="0">
-              <a:latin typeface="Arial Black" panose="020B0A04020102020204" pitchFamily="34" charset="0"/>
-            </a:endParaRPr>
           </a:p>
         </p:txBody>
       </p:sp>
@@ -7192,11 +6925,7 @@
             </a:r>
             <a:r>
               <a:rPr lang="en-US" sz="2800" b="1" dirty="0"/>
-              <a:t> (lead </a:t>
-            </a:r>
-            <a:r>
-              <a:rPr lang="en-US" sz="2800" b="1" dirty="0" smtClean="0"/>
-              <a:t>vocals, guitar)</a:t>
+              <a:t> (lead vocals, guitar)</a:t>
             </a:r>
           </a:p>
           <a:p>
@@ -7205,7 +6934,7 @@
               <a:buChar char="v"/>
             </a:pPr>
             <a:r>
-              <a:rPr lang="en-US" sz="2800" b="1" dirty="0" smtClean="0"/>
+              <a:rPr lang="en-US" sz="2800" b="1" dirty="0"/>
               <a:t>David </a:t>
             </a:r>
             <a:r>
@@ -7214,11 +6943,7 @@
             </a:r>
             <a:r>
               <a:rPr lang="en-US" sz="2800" b="1" dirty="0"/>
-              <a:t> (rhythm </a:t>
-            </a:r>
-            <a:r>
-              <a:rPr lang="en-US" sz="2800" b="1" dirty="0" smtClean="0"/>
-              <a:t>guitar, vocals)</a:t>
+              <a:t> (rhythm guitar, vocals)</a:t>
             </a:r>
           </a:p>
           <a:p>
@@ -7227,7 +6952,7 @@
               <a:buChar char="v"/>
             </a:pPr>
             <a:r>
-              <a:rPr lang="en-US" sz="2800" b="1" u="sng" dirty="0" smtClean="0"/>
+              <a:rPr lang="en-US" sz="2800" b="1" u="sng" dirty="0"/>
               <a:t>John </a:t>
             </a:r>
             <a:r>
@@ -7236,11 +6961,7 @@
             </a:r>
             <a:r>
               <a:rPr lang="en-US" sz="2800" b="1" dirty="0"/>
-              <a:t> (bass </a:t>
-            </a:r>
-            <a:r>
-              <a:rPr lang="en-US" sz="2800" b="1" dirty="0" smtClean="0"/>
-              <a:t>guitar, vocals)</a:t>
+              <a:t> (bass guitar, vocals)</a:t>
             </a:r>
           </a:p>
           <a:p>
@@ -7249,16 +6970,8 @@
               <a:buChar char="v"/>
             </a:pPr>
             <a:r>
-              <a:rPr lang="en-US" sz="2800" b="1" dirty="0" smtClean="0"/>
-              <a:t>Pick </a:t>
-            </a:r>
-            <a:r>
               <a:rPr lang="en-US" sz="2800" b="1" dirty="0"/>
-              <a:t>Withers (drums and percussion</a:t>
-            </a:r>
-            <a:r>
-              <a:rPr lang="en-US" sz="2800" b="1" dirty="0" smtClean="0"/>
-              <a:t>)</a:t>
+              <a:t>Pick Withers (drums and percussion)</a:t>
             </a:r>
           </a:p>
           <a:p>
@@ -7267,7 +6980,7 @@
               <a:buChar char="v"/>
             </a:pPr>
             <a:r>
-              <a:rPr lang="en-US" sz="2800" b="1" dirty="0" smtClean="0"/>
+              <a:rPr lang="en-US" sz="2800" b="1" dirty="0"/>
               <a:t>Jazz, folk, blues, and pub rock influences; not punk rock, in the age of punk and post-punk.</a:t>
             </a:r>
           </a:p>
@@ -7277,7 +6990,7 @@
               <a:buChar char="v"/>
             </a:pPr>
             <a:r>
-              <a:rPr lang="en-US" sz="2800" b="1" dirty="0" smtClean="0"/>
+              <a:rPr lang="en-US" sz="2800" b="1" dirty="0"/>
               <a:t>First big hit, “Sultans of Swing,” 1977, reached no. 4 in USA and no. 8 in UK.</a:t>
             </a:r>
           </a:p>
@@ -7287,15 +7000,15 @@
               <a:buChar char="v"/>
             </a:pPr>
             <a:r>
-              <a:rPr lang="en-US" sz="2800" b="1" dirty="0" smtClean="0"/>
+              <a:rPr lang="en-US" sz="2800" b="1" dirty="0"/>
               <a:t>First album, </a:t>
             </a:r>
             <a:r>
-              <a:rPr lang="en-US" sz="2800" b="1" i="1" dirty="0" smtClean="0"/>
+              <a:rPr lang="en-US" sz="2800" b="1" i="1" dirty="0"/>
               <a:t>Dire Straits</a:t>
             </a:r>
             <a:r>
-              <a:rPr lang="en-US" sz="2800" b="1" dirty="0" smtClean="0"/>
+              <a:rPr lang="en-US" sz="2800" b="1" dirty="0"/>
               <a:t>, 1978 reached top 10 in every west European country.</a:t>
             </a:r>
           </a:p>
@@ -7311,13 +7024,6 @@
   <p:clrMapOvr>
     <a:masterClrMapping/>
   </p:clrMapOvr>
-  <p:timing>
-    <p:tnLst>
-      <p:par>
-        <p:cTn id="1" dur="indefinite" restart="never" nodeType="tmRoot"/>
-      </p:par>
-    </p:tnLst>
-  </p:timing>
 </p:sld>
 </file>
 
@@ -7359,20 +7065,17 @@
           <a:lstStyle/>
           <a:p>
             <a:r>
-              <a:rPr lang="en-US" dirty="0" smtClean="0">
+              <a:rPr lang="en-US" dirty="0">
                 <a:latin typeface="Arial Black" panose="020B0A04020102020204" pitchFamily="34" charset="0"/>
               </a:rPr>
               <a:t>Dire Straits, </a:t>
             </a:r>
             <a:r>
-              <a:rPr lang="en-US" sz="3200" dirty="0" smtClean="0">
+              <a:rPr lang="en-US" sz="3200" dirty="0">
                 <a:latin typeface="Arial Black" panose="020B0A04020102020204" pitchFamily="34" charset="0"/>
               </a:rPr>
               <a:t>1977-1988, 1991-1995</a:t>
             </a:r>
-            <a:endParaRPr lang="en-US" sz="3200" dirty="0">
-              <a:latin typeface="Arial Black" panose="020B0A04020102020204" pitchFamily="34" charset="0"/>
-            </a:endParaRPr>
           </a:p>
         </p:txBody>
       </p:sp>
@@ -7403,19 +7106,19 @@
               <a:buChar char="v"/>
             </a:pPr>
             <a:r>
-              <a:rPr lang="en-US" sz="2800" b="1" i="1" dirty="0" smtClean="0"/>
+              <a:rPr lang="en-US" sz="2800" b="1" i="1" dirty="0"/>
               <a:t>Making Movies</a:t>
             </a:r>
             <a:r>
-              <a:rPr lang="en-US" sz="2800" b="1" dirty="0" smtClean="0"/>
+              <a:rPr lang="en-US" sz="2800" b="1" dirty="0"/>
               <a:t>, 1980: “</a:t>
             </a:r>
             <a:r>
-              <a:rPr lang="en-US" sz="2800" b="1" dirty="0" err="1" smtClean="0"/>
+              <a:rPr lang="en-US" sz="2800" b="1" dirty="0" err="1"/>
               <a:t>Skateaway</a:t>
             </a:r>
             <a:r>
-              <a:rPr lang="en-US" sz="2800" b="1" dirty="0" smtClean="0"/>
+              <a:rPr lang="en-US" sz="2800" b="1" dirty="0"/>
               <a:t>,” “Romeo and Juliet,” “Tunnel of Love”.</a:t>
             </a:r>
           </a:p>
@@ -7425,11 +7128,11 @@
               <a:buChar char="v"/>
             </a:pPr>
             <a:r>
-              <a:rPr lang="en-US" sz="2800" b="1" i="1" dirty="0" smtClean="0"/>
+              <a:rPr lang="en-US" sz="2800" b="1" i="1" dirty="0"/>
               <a:t>Brothers in Arms</a:t>
             </a:r>
             <a:r>
-              <a:rPr lang="en-US" sz="2800" b="1" dirty="0" smtClean="0"/>
+              <a:rPr lang="en-US" sz="2800" b="1" dirty="0"/>
               <a:t>, 1985: several number one singles, especially “Money for Nothing”:</a:t>
             </a:r>
           </a:p>
@@ -7442,15 +7145,9 @@
               <a:rPr lang="en-US" sz="2800" b="1" dirty="0">
                 <a:hlinkClick r:id="rId2"/>
               </a:rPr>
-              <a:t>https://</a:t>
-            </a:r>
-            <a:r>
-              <a:rPr lang="en-US" sz="2800" b="1" dirty="0" smtClean="0">
-                <a:hlinkClick r:id="rId2"/>
-              </a:rPr>
-              <a:t>www.youtube.com/watch?v=wTP2RUD_cL0</a:t>
-            </a:r>
-            <a:endParaRPr lang="en-US" sz="2800" b="1" dirty="0" smtClean="0"/>
+              <a:t>https://www.youtube.com/watch?v=wTP2RUD_cL0</a:t>
+            </a:r>
+            <a:endParaRPr lang="en-US" sz="2800" b="1" dirty="0"/>
           </a:p>
           <a:p>
             <a:pPr>
@@ -7458,11 +7155,11 @@
               <a:buChar char="v"/>
             </a:pPr>
             <a:r>
-              <a:rPr lang="en-US" sz="2800" b="1" dirty="0" err="1" smtClean="0"/>
+              <a:rPr lang="en-US" sz="2800" b="1" dirty="0" err="1"/>
               <a:t>Knopfler</a:t>
             </a:r>
             <a:r>
-              <a:rPr lang="en-US" sz="2800" b="1" dirty="0" smtClean="0"/>
+              <a:rPr lang="en-US" sz="2800" b="1" dirty="0"/>
               <a:t> was reluctant.</a:t>
             </a:r>
           </a:p>
@@ -7472,7 +7169,7 @@
               <a:buChar char="v"/>
             </a:pPr>
             <a:r>
-              <a:rPr lang="en-US" sz="2800" b="1" dirty="0" smtClean="0"/>
+              <a:rPr lang="en-US" sz="2800" b="1" dirty="0"/>
               <a:t>First computer-generated animation.</a:t>
             </a:r>
           </a:p>
@@ -7482,10 +7179,9 @@
               <a:buChar char="v"/>
             </a:pPr>
             <a:r>
-              <a:rPr lang="en-US" sz="2800" b="1" dirty="0" smtClean="0"/>
+              <a:rPr lang="en-US" sz="2800" b="1" dirty="0"/>
               <a:t>Launched MTV Europe in 1987.</a:t>
             </a:r>
-            <a:endParaRPr lang="en-US" sz="2800" b="1" dirty="0"/>
           </a:p>
         </p:txBody>
       </p:sp>
@@ -7529,13 +7225,6 @@
   <p:clrMapOvr>
     <a:masterClrMapping/>
   </p:clrMapOvr>
-  <p:timing>
-    <p:tnLst>
-      <p:par>
-        <p:cTn id="1" dur="indefinite" restart="never" nodeType="tmRoot"/>
-      </p:par>
-    </p:tnLst>
-  </p:timing>
 </p:sld>
 </file>
 
@@ -7572,14 +7261,11 @@
           <a:lstStyle/>
           <a:p>
             <a:r>
-              <a:rPr lang="en-US" b="1" dirty="0" smtClean="0">
+              <a:rPr lang="en-US" b="1" dirty="0">
                 <a:latin typeface="Algerian" panose="04020705040A02060702" pitchFamily="82" charset="0"/>
               </a:rPr>
               <a:t>Genesis, 1967-1998</a:t>
             </a:r>
-            <a:endParaRPr lang="en-US" b="1" dirty="0">
-              <a:latin typeface="Algerian" panose="04020705040A02060702" pitchFamily="82" charset="0"/>
-            </a:endParaRPr>
           </a:p>
         </p:txBody>
       </p:sp>
@@ -7610,7 +7296,7 @@
               <a:buChar char="v"/>
             </a:pPr>
             <a:r>
-              <a:rPr lang="en-US" sz="2400" b="1" dirty="0" smtClean="0"/>
+              <a:rPr lang="en-US" sz="2400" b="1" dirty="0"/>
               <a:t>Originally led by Peter Gabriel, Mike Rutherford, and Tony Banks.</a:t>
             </a:r>
           </a:p>
@@ -7620,7 +7306,7 @@
               <a:buChar char="v"/>
             </a:pPr>
             <a:r>
-              <a:rPr lang="en-US" sz="2400" b="1" dirty="0" smtClean="0"/>
+              <a:rPr lang="en-US" sz="2400" b="1" dirty="0"/>
               <a:t>1974: Gabriel left.</a:t>
             </a:r>
           </a:p>
@@ -7630,7 +7316,7 @@
               <a:buChar char="v"/>
             </a:pPr>
             <a:r>
-              <a:rPr lang="en-US" sz="2400" b="1" dirty="0" smtClean="0"/>
+              <a:rPr lang="en-US" sz="2400" b="1" dirty="0"/>
               <a:t>Drummer Phil Collins (joined in 1970) gradually became main song-writer and singer.</a:t>
             </a:r>
           </a:p>
@@ -7640,15 +7326,15 @@
               <a:buChar char="v"/>
             </a:pPr>
             <a:r>
-              <a:rPr lang="en-US" sz="2400" b="1" dirty="0" smtClean="0"/>
+              <a:rPr lang="en-US" sz="2400" b="1" dirty="0"/>
               <a:t>1986: </a:t>
             </a:r>
             <a:r>
-              <a:rPr lang="en-US" sz="2400" b="1" i="1" dirty="0" smtClean="0"/>
+              <a:rPr lang="en-US" sz="2400" b="1" i="1" dirty="0"/>
               <a:t>Invisible Touch</a:t>
             </a:r>
             <a:r>
-              <a:rPr lang="en-US" sz="2400" b="1" dirty="0" smtClean="0"/>
+              <a:rPr lang="en-US" sz="2400" b="1" dirty="0"/>
               <a:t>, first top-selling album, with single and video: “Land of Confusion”</a:t>
             </a:r>
           </a:p>
@@ -7661,15 +7347,9 @@
               <a:rPr lang="en-US" sz="2400" b="1" dirty="0">
                 <a:hlinkClick r:id="rId2"/>
               </a:rPr>
-              <a:t>https://</a:t>
-            </a:r>
-            <a:r>
-              <a:rPr lang="en-US" sz="2400" b="1" dirty="0" smtClean="0">
-                <a:hlinkClick r:id="rId2"/>
-              </a:rPr>
-              <a:t>www.youtube.com/watch?v=TlBIa8z_Mts</a:t>
-            </a:r>
-            <a:endParaRPr lang="en-US" sz="2400" b="1" dirty="0" smtClean="0"/>
+              <a:t>https://www.youtube.com/watch?v=TlBIa8z_Mts</a:t>
+            </a:r>
+            <a:endParaRPr lang="en-US" sz="2400" b="1" dirty="0"/>
           </a:p>
           <a:p>
             <a:pPr>
@@ -7720,13 +7400,6 @@
   <p:clrMapOvr>
     <a:masterClrMapping/>
   </p:clrMapOvr>
-  <p:timing>
-    <p:tnLst>
-      <p:par>
-        <p:cTn id="1" dur="indefinite" restart="never" nodeType="tmRoot"/>
-      </p:par>
-    </p:tnLst>
-  </p:timing>
 </p:sld>
 </file>
 

</xml_diff>